<commit_message>
finish the chatBot part
</commit_message>
<xml_diff>
--- a/ADE_copilot/CIC-2025_PPT_ADECopilot.pptx
+++ b/ADE_copilot/CIC-2025_PPT_ADECopilot.pptx
@@ -5,21 +5,22 @@
     <p:sldMasterId id="2147483666" r:id="rId4"/>
   </p:sldMasterIdLst>
   <p:notesMasterIdLst>
-    <p:notesMasterId r:id="rId14"/>
+    <p:notesMasterId r:id="rId15"/>
   </p:notesMasterIdLst>
   <p:handoutMasterIdLst>
-    <p:handoutMasterId r:id="rId15"/>
+    <p:handoutMasterId r:id="rId16"/>
   </p:handoutMasterIdLst>
   <p:sldIdLst>
     <p:sldId id="2147309208" r:id="rId5"/>
     <p:sldId id="2147309214" r:id="rId6"/>
     <p:sldId id="2147309217" r:id="rId7"/>
-    <p:sldId id="2147309216" r:id="rId8"/>
-    <p:sldId id="2147309215" r:id="rId9"/>
-    <p:sldId id="2147309212" r:id="rId10"/>
-    <p:sldId id="2147309213" r:id="rId11"/>
-    <p:sldId id="2147309209" r:id="rId12"/>
-    <p:sldId id="2147309207" r:id="rId13"/>
+    <p:sldId id="2147309218" r:id="rId8"/>
+    <p:sldId id="2147309216" r:id="rId9"/>
+    <p:sldId id="2147309215" r:id="rId10"/>
+    <p:sldId id="2147309212" r:id="rId11"/>
+    <p:sldId id="2147309213" r:id="rId12"/>
+    <p:sldId id="2147309209" r:id="rId13"/>
+    <p:sldId id="2147309207" r:id="rId14"/>
   </p:sldIdLst>
   <p:sldSz cx="12192000" cy="6858000"/>
   <p:notesSz cx="6858000" cy="9144000"/>
@@ -4564,6 +4565,36 @@
 </p:sld>
 </file>
 
+<file path=ppt/slides/slide10.xml><?xml version="1.0" encoding="utf-8"?>
+<p:sld xmlns:a="http://schemas.openxmlformats.org/drawingml/2006/main" xmlns:r="http://schemas.openxmlformats.org/officeDocument/2006/relationships" xmlns:p="http://schemas.openxmlformats.org/presentationml/2006/main">
+  <p:cSld>
+    <p:spTree>
+      <p:nvGrpSpPr>
+        <p:cNvPr id="1" name=""/>
+        <p:cNvGrpSpPr/>
+        <p:nvPr/>
+      </p:nvGrpSpPr>
+      <p:grpSpPr>
+        <a:xfrm>
+          <a:off x="0" y="0"/>
+          <a:ext cx="0" cy="0"/>
+          <a:chOff x="0" y="0"/>
+          <a:chExt cx="0" cy="0"/>
+        </a:xfrm>
+      </p:grpSpPr>
+    </p:spTree>
+    <p:extLst>
+      <p:ext uri="{BB962C8B-B14F-4D97-AF65-F5344CB8AC3E}">
+        <p14:creationId xmlns:p14="http://schemas.microsoft.com/office/powerpoint/2010/main" val="1605182155"/>
+      </p:ext>
+    </p:extLst>
+  </p:cSld>
+  <p:clrMapOvr>
+    <a:masterClrMapping/>
+  </p:clrMapOvr>
+</p:sld>
+</file>
+
 <file path=ppt/slides/slide2.xml><?xml version="1.0" encoding="utf-8"?>
 <p:sld xmlns:a="http://schemas.openxmlformats.org/drawingml/2006/main" xmlns:r="http://schemas.openxmlformats.org/officeDocument/2006/relationships" xmlns:p="http://schemas.openxmlformats.org/presentationml/2006/main">
   <p:cSld>
@@ -4609,6 +4640,42 @@
           </a:p>
         </p:txBody>
       </p:sp>
+      <p:pic>
+        <p:nvPicPr>
+          <p:cNvPr id="2" name="Picture 1">
+            <a:extLst>
+              <a:ext uri="{FF2B5EF4-FFF2-40B4-BE49-F238E27FC236}">
+                <a16:creationId xmlns:a16="http://schemas.microsoft.com/office/drawing/2014/main" id="{8E604AE0-51E6-748E-86B8-DB514394D313}"/>
+              </a:ext>
+            </a:extLst>
+          </p:cNvPr>
+          <p:cNvPicPr>
+            <a:picLocks noChangeAspect="1"/>
+          </p:cNvPicPr>
+          <p:nvPr/>
+        </p:nvPicPr>
+        <p:blipFill>
+          <a:blip r:embed="rId2" cstate="print">
+            <a:extLst>
+              <a:ext uri="{28A0092B-C50C-407E-A947-70E740481C1C}">
+                <a14:useLocalDpi xmlns:a14="http://schemas.microsoft.com/office/drawing/2010/main" val="0"/>
+              </a:ext>
+            </a:extLst>
+          </a:blip>
+          <a:stretch>
+            <a:fillRect/>
+          </a:stretch>
+        </p:blipFill>
+        <p:spPr>
+          <a:xfrm>
+            <a:off x="1266726" y="930275"/>
+            <a:ext cx="9658547" cy="5569143"/>
+          </a:xfrm>
+          <a:prstGeom prst="rect">
+            <a:avLst/>
+          </a:prstGeom>
+        </p:spPr>
+      </p:pic>
     </p:spTree>
     <p:extLst>
       <p:ext uri="{BB962C8B-B14F-4D97-AF65-F5344CB8AC3E}">
@@ -4688,7 +4755,12 @@
             <p:ph idx="1"/>
           </p:nvPr>
         </p:nvSpPr>
-        <p:spPr/>
+        <p:spPr>
+          <a:xfrm>
+            <a:off x="435431" y="1188720"/>
+            <a:ext cx="9462714" cy="5146766"/>
+          </a:xfrm>
+        </p:spPr>
         <p:txBody>
           <a:bodyPr/>
           <a:lstStyle/>
@@ -4702,7 +4774,173 @@
             <a:pPr lvl="1"/>
             <a:r>
               <a:rPr lang="en-US" dirty="0"/>
-              <a:t>Improper setting of job policy leads to waste of resources</a:t>
+              <a:t>ADE has too many features </a:t>
+            </a:r>
+          </a:p>
+          <a:p>
+            <a:pPr lvl="1"/>
+            <a:r>
+              <a:rPr lang="en-US" dirty="0"/>
+              <a:t>Traditional learning methods can no longer meet the needs</a:t>
+            </a:r>
+          </a:p>
+          <a:p>
+            <a:pPr lvl="1"/>
+            <a:r>
+              <a:rPr lang="en-US" dirty="0"/>
+              <a:t>An interactive engineering assistant based on LLM is a better choice</a:t>
+            </a:r>
+          </a:p>
+          <a:p>
+            <a:pPr lvl="1"/>
+            <a:endParaRPr lang="en-US" dirty="0"/>
+          </a:p>
+        </p:txBody>
+      </p:sp>
+      <p:pic>
+        <p:nvPicPr>
+          <p:cNvPr id="11" name="Picture 10">
+            <a:extLst>
+              <a:ext uri="{FF2B5EF4-FFF2-40B4-BE49-F238E27FC236}">
+                <a16:creationId xmlns:a16="http://schemas.microsoft.com/office/drawing/2014/main" id="{7572B7C6-BFF1-FA29-C3FC-EDDFEFF3C5EC}"/>
+              </a:ext>
+            </a:extLst>
+          </p:cNvPr>
+          <p:cNvPicPr>
+            <a:picLocks noChangeAspect="1"/>
+          </p:cNvPicPr>
+          <p:nvPr/>
+        </p:nvPicPr>
+        <p:blipFill>
+          <a:blip r:embed="rId2" cstate="print">
+            <a:extLst>
+              <a:ext uri="{28A0092B-C50C-407E-A947-70E740481C1C}">
+                <a14:useLocalDpi xmlns:a14="http://schemas.microsoft.com/office/drawing/2010/main" val="0"/>
+              </a:ext>
+            </a:extLst>
+          </a:blip>
+          <a:stretch>
+            <a:fillRect/>
+          </a:stretch>
+        </p:blipFill>
+        <p:spPr>
+          <a:xfrm>
+            <a:off x="1316371" y="2952043"/>
+            <a:ext cx="2728066" cy="2785798"/>
+          </a:xfrm>
+          <a:prstGeom prst="rect">
+            <a:avLst/>
+          </a:prstGeom>
+        </p:spPr>
+      </p:pic>
+      <p:sp>
+        <p:nvSpPr>
+          <p:cNvPr id="12" name="TextBox 11">
+            <a:extLst>
+              <a:ext uri="{FF2B5EF4-FFF2-40B4-BE49-F238E27FC236}">
+                <a16:creationId xmlns:a16="http://schemas.microsoft.com/office/drawing/2014/main" id="{E4E4F58C-CAE6-13A5-88E0-EFA121F7B33E}"/>
+              </a:ext>
+            </a:extLst>
+          </p:cNvPr>
+          <p:cNvSpPr txBox="1"/>
+          <p:nvPr/>
+        </p:nvSpPr>
+        <p:spPr>
+          <a:xfrm>
+            <a:off x="1334885" y="5815390"/>
+            <a:ext cx="2514919" cy="307777"/>
+          </a:xfrm>
+          <a:prstGeom prst="rect">
+            <a:avLst/>
+          </a:prstGeom>
+          <a:noFill/>
+        </p:spPr>
+        <p:txBody>
+          <a:bodyPr wrap="none" rtlCol="0">
+            <a:spAutoFit/>
+          </a:bodyPr>
+          <a:lstStyle/>
+          <a:p>
+            <a:r>
+              <a:rPr lang="en-US" sz="1400" b="1" dirty="0">
+                <a:latin typeface="Times New Roman" panose="02020603050405020304" pitchFamily="18" charset="0"/>
+                <a:cs typeface="Times New Roman" panose="02020603050405020304" pitchFamily="18" charset="0"/>
+              </a:rPr>
+              <a:t>Traditional Learning Methods</a:t>
+            </a:r>
+          </a:p>
+        </p:txBody>
+      </p:sp>
+      <p:pic>
+        <p:nvPicPr>
+          <p:cNvPr id="13" name="Picture 12">
+            <a:extLst>
+              <a:ext uri="{FF2B5EF4-FFF2-40B4-BE49-F238E27FC236}">
+                <a16:creationId xmlns:a16="http://schemas.microsoft.com/office/drawing/2014/main" id="{206DA350-73CC-A6EA-6B38-81CB651CE053}"/>
+              </a:ext>
+            </a:extLst>
+          </p:cNvPr>
+          <p:cNvPicPr>
+            <a:picLocks noChangeAspect="1"/>
+          </p:cNvPicPr>
+          <p:nvPr/>
+        </p:nvPicPr>
+        <p:blipFill>
+          <a:blip r:embed="rId3" cstate="print">
+            <a:extLst>
+              <a:ext uri="{28A0092B-C50C-407E-A947-70E740481C1C}">
+                <a14:useLocalDpi xmlns:a14="http://schemas.microsoft.com/office/drawing/2010/main" val="0"/>
+              </a:ext>
+            </a:extLst>
+          </a:blip>
+          <a:stretch>
+            <a:fillRect/>
+          </a:stretch>
+        </p:blipFill>
+        <p:spPr>
+          <a:xfrm>
+            <a:off x="4841452" y="2871361"/>
+            <a:ext cx="7217741" cy="2462206"/>
+          </a:xfrm>
+          <a:prstGeom prst="rect">
+            <a:avLst/>
+          </a:prstGeom>
+        </p:spPr>
+      </p:pic>
+      <p:sp>
+        <p:nvSpPr>
+          <p:cNvPr id="14" name="TextBox 13">
+            <a:extLst>
+              <a:ext uri="{FF2B5EF4-FFF2-40B4-BE49-F238E27FC236}">
+                <a16:creationId xmlns:a16="http://schemas.microsoft.com/office/drawing/2014/main" id="{17A5B4D4-44B6-8B08-29BB-18DCA96E97EB}"/>
+              </a:ext>
+            </a:extLst>
+          </p:cNvPr>
+          <p:cNvSpPr txBox="1"/>
+          <p:nvPr/>
+        </p:nvSpPr>
+        <p:spPr>
+          <a:xfrm>
+            <a:off x="8048341" y="5815390"/>
+            <a:ext cx="2709396" cy="307777"/>
+          </a:xfrm>
+          <a:prstGeom prst="rect">
+            <a:avLst/>
+          </a:prstGeom>
+          <a:noFill/>
+        </p:spPr>
+        <p:txBody>
+          <a:bodyPr wrap="none" rtlCol="0">
+            <a:spAutoFit/>
+          </a:bodyPr>
+          <a:lstStyle/>
+          <a:p>
+            <a:r>
+              <a:rPr lang="en-US" sz="1400" b="1" dirty="0">
+                <a:latin typeface="Times New Roman" panose="02020603050405020304" pitchFamily="18" charset="0"/>
+                <a:cs typeface="Times New Roman" panose="02020603050405020304" pitchFamily="18" charset="0"/>
+              </a:rPr>
+              <a:t>Interactive Engineering assistant</a:t>
             </a:r>
           </a:p>
         </p:txBody>
@@ -4760,6 +4998,148 @@
           <a:p>
             <a:r>
               <a:rPr lang="en-US" dirty="0"/>
+              <a:t>Assistant Chat</a:t>
+            </a:r>
+            <a:r>
+              <a:rPr lang="en-US" altLang="zh-CN" dirty="0"/>
+              <a:t>bot</a:t>
+            </a:r>
+            <a:endParaRPr lang="en-US" dirty="0"/>
+          </a:p>
+        </p:txBody>
+      </p:sp>
+      <p:sp>
+        <p:nvSpPr>
+          <p:cNvPr id="9" name="Content Placeholder 8">
+            <a:extLst>
+              <a:ext uri="{FF2B5EF4-FFF2-40B4-BE49-F238E27FC236}">
+                <a16:creationId xmlns:a16="http://schemas.microsoft.com/office/drawing/2014/main" id="{8ACA9132-46BF-181E-1665-517FD2CC6CC7}"/>
+              </a:ext>
+            </a:extLst>
+          </p:cNvPr>
+          <p:cNvSpPr>
+            <a:spLocks noGrp="1"/>
+          </p:cNvSpPr>
+          <p:nvPr>
+            <p:ph idx="1"/>
+          </p:nvPr>
+        </p:nvSpPr>
+        <p:spPr>
+          <a:xfrm>
+            <a:off x="435431" y="1188720"/>
+            <a:ext cx="9462714" cy="5146766"/>
+          </a:xfrm>
+        </p:spPr>
+        <p:txBody>
+          <a:bodyPr/>
+          <a:lstStyle/>
+          <a:p>
+            <a:r>
+              <a:rPr lang="en-US" dirty="0"/>
+              <a:t>How ADE Copilot solves this problem</a:t>
+            </a:r>
+          </a:p>
+          <a:p>
+            <a:pPr lvl="1"/>
+            <a:r>
+              <a:rPr lang="en-US" dirty="0"/>
+              <a:t>Implement interactive engineering assistant based on pre-trained LLM(Large Language Model) and RAG(Retrieval Enhancement Generation)</a:t>
+            </a:r>
+          </a:p>
+        </p:txBody>
+      </p:sp>
+      <p:pic>
+        <p:nvPicPr>
+          <p:cNvPr id="6" name="Graphic 5">
+            <a:extLst>
+              <a:ext uri="{FF2B5EF4-FFF2-40B4-BE49-F238E27FC236}">
+                <a16:creationId xmlns:a16="http://schemas.microsoft.com/office/drawing/2014/main" id="{B435E3ED-F2D8-A01A-884A-43EAE46218D6}"/>
+              </a:ext>
+            </a:extLst>
+          </p:cNvPr>
+          <p:cNvPicPr>
+            <a:picLocks noChangeAspect="1"/>
+          </p:cNvPicPr>
+          <p:nvPr/>
+        </p:nvPicPr>
+        <p:blipFill>
+          <a:blip r:embed="rId2">
+            <a:extLst>
+              <a:ext uri="{28A0092B-C50C-407E-A947-70E740481C1C}">
+                <a14:useLocalDpi xmlns:a14="http://schemas.microsoft.com/office/drawing/2010/main" val="0"/>
+              </a:ext>
+              <a:ext uri="{96DAC541-7B7A-43D3-8B79-37D633B846F1}">
+                <asvg:svgBlip xmlns:asvg="http://schemas.microsoft.com/office/drawing/2016/SVG/main" r:embed="rId3"/>
+              </a:ext>
+            </a:extLst>
+          </a:blip>
+          <a:stretch>
+            <a:fillRect/>
+          </a:stretch>
+        </p:blipFill>
+        <p:spPr>
+          <a:xfrm>
+            <a:off x="1570030" y="2235448"/>
+            <a:ext cx="8901112" cy="4257427"/>
+          </a:xfrm>
+          <a:prstGeom prst="rect">
+            <a:avLst/>
+          </a:prstGeom>
+        </p:spPr>
+      </p:pic>
+    </p:spTree>
+    <p:extLst>
+      <p:ext uri="{BB962C8B-B14F-4D97-AF65-F5344CB8AC3E}">
+        <p14:creationId xmlns:p14="http://schemas.microsoft.com/office/powerpoint/2010/main" val="2274113233"/>
+      </p:ext>
+    </p:extLst>
+  </p:cSld>
+  <p:clrMapOvr>
+    <a:masterClrMapping/>
+  </p:clrMapOvr>
+</p:sld>
+</file>
+
+<file path=ppt/slides/slide5.xml><?xml version="1.0" encoding="utf-8"?>
+<p:sld xmlns:a="http://schemas.openxmlformats.org/drawingml/2006/main" xmlns:r="http://schemas.openxmlformats.org/officeDocument/2006/relationships" xmlns:p="http://schemas.openxmlformats.org/presentationml/2006/main">
+  <p:cSld>
+    <p:spTree>
+      <p:nvGrpSpPr>
+        <p:cNvPr id="1" name=""/>
+        <p:cNvGrpSpPr/>
+        <p:nvPr/>
+      </p:nvGrpSpPr>
+      <p:grpSpPr>
+        <a:xfrm>
+          <a:off x="0" y="0"/>
+          <a:ext cx="0" cy="0"/>
+          <a:chOff x="0" y="0"/>
+          <a:chExt cx="0" cy="0"/>
+        </a:xfrm>
+      </p:grpSpPr>
+      <p:sp>
+        <p:nvSpPr>
+          <p:cNvPr id="3" name="Title 2">
+            <a:extLst>
+              <a:ext uri="{FF2B5EF4-FFF2-40B4-BE49-F238E27FC236}">
+                <a16:creationId xmlns:a16="http://schemas.microsoft.com/office/drawing/2014/main" id="{154D3AFC-DD18-8348-0D8D-D1A81365CA40}"/>
+              </a:ext>
+            </a:extLst>
+          </p:cNvPr>
+          <p:cNvSpPr>
+            <a:spLocks noGrp="1"/>
+          </p:cNvSpPr>
+          <p:nvPr>
+            <p:ph type="title"/>
+          </p:nvPr>
+        </p:nvSpPr>
+        <p:spPr/>
+        <p:txBody>
+          <a:bodyPr/>
+          <a:lstStyle/>
+          <a:p>
+            <a:r>
+              <a:rPr lang="en-US" dirty="0"/>
               <a:t>Verifier Requirements Automation</a:t>
             </a:r>
           </a:p>
@@ -4813,7 +5193,7 @@
 </p:sld>
 </file>
 
-<file path=ppt/slides/slide5.xml><?xml version="1.0" encoding="utf-8"?>
+<file path=ppt/slides/slide6.xml><?xml version="1.0" encoding="utf-8"?>
 <p:sld xmlns:a="http://schemas.openxmlformats.org/drawingml/2006/main" xmlns:r="http://schemas.openxmlformats.org/officeDocument/2006/relationships" xmlns:p="http://schemas.openxmlformats.org/presentationml/2006/main">
   <p:cSld>
     <p:spTree>
@@ -5160,7 +5540,7 @@
 </p:sld>
 </file>
 
-<file path=ppt/slides/slide6.xml><?xml version="1.0" encoding="utf-8"?>
+<file path=ppt/slides/slide7.xml><?xml version="1.0" encoding="utf-8"?>
 <p:sld xmlns:a="http://schemas.openxmlformats.org/drawingml/2006/main" xmlns:r="http://schemas.openxmlformats.org/officeDocument/2006/relationships" xmlns:p="http://schemas.openxmlformats.org/presentationml/2006/main">
   <p:cSld>
     <p:spTree>
@@ -6240,7 +6620,7 @@
 </p:sld>
 </file>
 
-<file path=ppt/slides/slide7.xml><?xml version="1.0" encoding="utf-8"?>
+<file path=ppt/slides/slide8.xml><?xml version="1.0" encoding="utf-8"?>
 <p:sld xmlns:a="http://schemas.openxmlformats.org/drawingml/2006/main" xmlns:r="http://schemas.openxmlformats.org/officeDocument/2006/relationships" xmlns:p="http://schemas.openxmlformats.org/presentationml/2006/main">
   <p:cSld>
     <p:spTree>
@@ -6969,7 +7349,7 @@
 </p:sld>
 </file>
 
-<file path=ppt/slides/slide8.xml><?xml version="1.0" encoding="utf-8"?>
+<file path=ppt/slides/slide9.xml><?xml version="1.0" encoding="utf-8"?>
 <p:sld xmlns:a="http://schemas.openxmlformats.org/drawingml/2006/main" xmlns:r="http://schemas.openxmlformats.org/officeDocument/2006/relationships" xmlns:p="http://schemas.openxmlformats.org/presentationml/2006/main">
   <p:cSld>
     <p:spTree>
@@ -7040,36 +7420,6 @@
     <p:extLst>
       <p:ext uri="{BB962C8B-B14F-4D97-AF65-F5344CB8AC3E}">
         <p14:creationId xmlns:p14="http://schemas.microsoft.com/office/powerpoint/2010/main" val="1957047950"/>
-      </p:ext>
-    </p:extLst>
-  </p:cSld>
-  <p:clrMapOvr>
-    <a:masterClrMapping/>
-  </p:clrMapOvr>
-</p:sld>
-</file>
-
-<file path=ppt/slides/slide9.xml><?xml version="1.0" encoding="utf-8"?>
-<p:sld xmlns:a="http://schemas.openxmlformats.org/drawingml/2006/main" xmlns:r="http://schemas.openxmlformats.org/officeDocument/2006/relationships" xmlns:p="http://schemas.openxmlformats.org/presentationml/2006/main">
-  <p:cSld>
-    <p:spTree>
-      <p:nvGrpSpPr>
-        <p:cNvPr id="1" name=""/>
-        <p:cNvGrpSpPr/>
-        <p:nvPr/>
-      </p:nvGrpSpPr>
-      <p:grpSpPr>
-        <a:xfrm>
-          <a:off x="0" y="0"/>
-          <a:ext cx="0" cy="0"/>
-          <a:chOff x="0" y="0"/>
-          <a:chExt cx="0" cy="0"/>
-        </a:xfrm>
-      </p:grpSpPr>
-    </p:spTree>
-    <p:extLst>
-      <p:ext uri="{BB962C8B-B14F-4D97-AF65-F5344CB8AC3E}">
-        <p14:creationId xmlns:p14="http://schemas.microsoft.com/office/powerpoint/2010/main" val="1605182155"/>
       </p:ext>
     </p:extLst>
   </p:cSld>
@@ -7836,28 +8186,6 @@
 </file>
 
 <file path=customXml/item1.xml><?xml version="1.0" encoding="utf-8"?>
-<?mso-contentType ?>
-<FormTemplates xmlns="http://schemas.microsoft.com/sharepoint/v3/contenttype/forms">
-  <Display>DocumentLibraryForm</Display>
-  <Edit>DocumentLibraryForm</Edit>
-  <New>DocumentLibraryForm</New>
-</FormTemplates>
-</file>
-
-<file path=customXml/item2.xml><?xml version="1.0" encoding="utf-8"?>
-<p:properties xmlns:p="http://schemas.microsoft.com/office/2006/metadata/properties" xmlns:xsi="http://www.w3.org/2001/XMLSchema-instance" xmlns:pc="http://schemas.microsoft.com/office/infopath/2007/PartnerControls">
-  <documentManagement>
-    <TaxCatchAll xmlns="7b8458dc-598e-4883-bee3-b65cd33e2373" xsi:nil="true"/>
-    <lcf76f155ced4ddcb4097134ff3c332f xmlns="4d616b5b-752e-49e1-bc84-983707c3b45d">
-      <Terms xmlns="http://schemas.microsoft.com/office/infopath/2007/PartnerControls"/>
-    </lcf76f155ced4ddcb4097134ff3c332f>
-    <_ip_UnifiedCompliancePolicyUIAction xmlns="http://schemas.microsoft.com/sharepoint/v3" xsi:nil="true"/>
-    <_ip_UnifiedCompliancePolicyProperties xmlns="http://schemas.microsoft.com/sharepoint/v3" xsi:nil="true"/>
-  </documentManagement>
-</p:properties>
-</file>
-
-<file path=customXml/item3.xml><?xml version="1.0" encoding="utf-8"?>
 <ct:contentTypeSchema xmlns:ct="http://schemas.microsoft.com/office/2006/metadata/contentType" xmlns:ma="http://schemas.microsoft.com/office/2006/metadata/properties/metaAttributes" ct:_="" ma:_="" ma:contentTypeName="Document" ma:contentTypeID="0x010100EA1802221C47224DAD2E1CD157C76B66" ma:contentTypeVersion="15" ma:contentTypeDescription="Create a new document." ma:contentTypeScope="" ma:versionID="363dbe0862a1b9cf731691ddd7ebcb66">
   <xsd:schema xmlns:xsd="http://www.w3.org/2001/XMLSchema" xmlns:xs="http://www.w3.org/2001/XMLSchema" xmlns:p="http://schemas.microsoft.com/office/2006/metadata/properties" xmlns:ns1="http://schemas.microsoft.com/sharepoint/v3" xmlns:ns2="4d616b5b-752e-49e1-bc84-983707c3b45d" xmlns:ns3="7b8458dc-598e-4883-bee3-b65cd33e2373" targetNamespace="http://schemas.microsoft.com/office/2006/metadata/properties" ma:root="true" ma:fieldsID="2291c4afe0501b639051f6a2b720ae43" ns1:_="" ns2:_="" ns3:_="">
     <xsd:import namespace="http://schemas.microsoft.com/sharepoint/v3"/>
@@ -8095,10 +8423,44 @@
 </ct:contentTypeSchema>
 </file>
 
+<file path=customXml/item2.xml><?xml version="1.0" encoding="utf-8"?>
+<p:properties xmlns:p="http://schemas.microsoft.com/office/2006/metadata/properties" xmlns:xsi="http://www.w3.org/2001/XMLSchema-instance" xmlns:pc="http://schemas.microsoft.com/office/infopath/2007/PartnerControls">
+  <documentManagement>
+    <TaxCatchAll xmlns="7b8458dc-598e-4883-bee3-b65cd33e2373" xsi:nil="true"/>
+    <lcf76f155ced4ddcb4097134ff3c332f xmlns="4d616b5b-752e-49e1-bc84-983707c3b45d">
+      <Terms xmlns="http://schemas.microsoft.com/office/infopath/2007/PartnerControls"/>
+    </lcf76f155ced4ddcb4097134ff3c332f>
+    <_ip_UnifiedCompliancePolicyUIAction xmlns="http://schemas.microsoft.com/sharepoint/v3" xsi:nil="true"/>
+    <_ip_UnifiedCompliancePolicyProperties xmlns="http://schemas.microsoft.com/sharepoint/v3" xsi:nil="true"/>
+  </documentManagement>
+</p:properties>
+</file>
+
+<file path=customXml/item3.xml><?xml version="1.0" encoding="utf-8"?>
+<?mso-contentType ?>
+<FormTemplates xmlns="http://schemas.microsoft.com/sharepoint/v3/contenttype/forms">
+  <Display>DocumentLibraryForm</Display>
+  <Edit>DocumentLibraryForm</Edit>
+  <New>DocumentLibraryForm</New>
+</FormTemplates>
+</file>
+
 <file path=customXml/itemProps1.xml><?xml version="1.0" encoding="utf-8"?>
-<ds:datastoreItem xmlns:ds="http://schemas.openxmlformats.org/officeDocument/2006/customXml" ds:itemID="{26A66B61-4F06-44C8-9162-4B6D2BCADA53}">
+<ds:datastoreItem xmlns:ds="http://schemas.openxmlformats.org/officeDocument/2006/customXml" ds:itemID="{5F414E3A-68DA-42A0-8EE0-8D409A8A8051}">
   <ds:schemaRefs>
-    <ds:schemaRef ds:uri="http://schemas.microsoft.com/sharepoint/v3/contenttype/forms"/>
+    <ds:schemaRef ds:uri="http://schemas.microsoft.com/office/2006/metadata/contentType"/>
+    <ds:schemaRef ds:uri="http://schemas.microsoft.com/office/2006/metadata/properties/metaAttributes"/>
+    <ds:schemaRef ds:uri="http://www.w3.org/2001/XMLSchema"/>
+    <ds:schemaRef ds:uri="http://schemas.microsoft.com/office/2006/metadata/properties"/>
+    <ds:schemaRef ds:uri="http://schemas.microsoft.com/sharepoint/v3"/>
+    <ds:schemaRef ds:uri="4d616b5b-752e-49e1-bc84-983707c3b45d"/>
+    <ds:schemaRef ds:uri="7b8458dc-598e-4883-bee3-b65cd33e2373"/>
+    <ds:schemaRef ds:uri="http://schemas.microsoft.com/office/2006/documentManagement/types"/>
+    <ds:schemaRef ds:uri="http://schemas.microsoft.com/office/infopath/2007/PartnerControls"/>
+    <ds:schemaRef ds:uri="http://schemas.openxmlformats.org/package/2006/metadata/core-properties"/>
+    <ds:schemaRef ds:uri="http://purl.org/dc/elements/1.1/"/>
+    <ds:schemaRef ds:uri="http://purl.org/dc/terms/"/>
+    <ds:schemaRef ds:uri="http://schemas.microsoft.com/internal/obd"/>
   </ds:schemaRefs>
 </ds:datastoreItem>
 </file>
@@ -8122,21 +8484,9 @@
 </file>
 
 <file path=customXml/itemProps3.xml><?xml version="1.0" encoding="utf-8"?>
-<ds:datastoreItem xmlns:ds="http://schemas.openxmlformats.org/officeDocument/2006/customXml" ds:itemID="{5F414E3A-68DA-42A0-8EE0-8D409A8A8051}">
+<ds:datastoreItem xmlns:ds="http://schemas.openxmlformats.org/officeDocument/2006/customXml" ds:itemID="{26A66B61-4F06-44C8-9162-4B6D2BCADA53}">
   <ds:schemaRefs>
-    <ds:schemaRef ds:uri="http://schemas.microsoft.com/office/2006/metadata/contentType"/>
-    <ds:schemaRef ds:uri="http://schemas.microsoft.com/office/2006/metadata/properties/metaAttributes"/>
-    <ds:schemaRef ds:uri="http://www.w3.org/2001/XMLSchema"/>
-    <ds:schemaRef ds:uri="http://schemas.microsoft.com/office/2006/metadata/properties"/>
-    <ds:schemaRef ds:uri="http://schemas.microsoft.com/sharepoint/v3"/>
-    <ds:schemaRef ds:uri="4d616b5b-752e-49e1-bc84-983707c3b45d"/>
-    <ds:schemaRef ds:uri="7b8458dc-598e-4883-bee3-b65cd33e2373"/>
-    <ds:schemaRef ds:uri="http://schemas.microsoft.com/office/2006/documentManagement/types"/>
-    <ds:schemaRef ds:uri="http://schemas.microsoft.com/office/infopath/2007/PartnerControls"/>
-    <ds:schemaRef ds:uri="http://schemas.openxmlformats.org/package/2006/metadata/core-properties"/>
-    <ds:schemaRef ds:uri="http://purl.org/dc/elements/1.1/"/>
-    <ds:schemaRef ds:uri="http://purl.org/dc/terms/"/>
-    <ds:schemaRef ds:uri="http://schemas.microsoft.com/internal/obd"/>
+    <ds:schemaRef ds:uri="http://schemas.microsoft.com/sharepoint/v3/contenttype/forms"/>
   </ds:schemaRefs>
 </ds:datastoreItem>
 </file>
</xml_diff>

<commit_message>
first version to jinduo
</commit_message>
<xml_diff>
--- a/ADE_copilot/CIC-2025_PPT_ADECopilot.pptx
+++ b/ADE_copilot/CIC-2025_PPT_ADECopilot.pptx
@@ -5,10 +5,10 @@
     <p:sldMasterId id="2147483666" r:id="rId4"/>
   </p:sldMasterIdLst>
   <p:notesMasterIdLst>
-    <p:notesMasterId r:id="rId17"/>
+    <p:notesMasterId r:id="rId16"/>
   </p:notesMasterIdLst>
   <p:handoutMasterIdLst>
-    <p:handoutMasterId r:id="rId18"/>
+    <p:handoutMasterId r:id="rId17"/>
   </p:handoutMasterIdLst>
   <p:sldIdLst>
     <p:sldId id="2147309208" r:id="rId5"/>
@@ -21,8 +21,7 @@
     <p:sldId id="2147309215" r:id="rId12"/>
     <p:sldId id="2147309212" r:id="rId13"/>
     <p:sldId id="2147309213" r:id="rId14"/>
-    <p:sldId id="2147309209" r:id="rId15"/>
-    <p:sldId id="2147309207" r:id="rId16"/>
+    <p:sldId id="2147309207" r:id="rId15"/>
   </p:sldIdLst>
   <p:sldSz cx="12192000" cy="6858000"/>
   <p:notesSz cx="6858000" cy="9144000"/>
@@ -4517,7 +4516,7 @@
                   <a:schemeClr val="bg1"/>
                 </a:solidFill>
               </a:rPr>
-              <a:t>June 17-20</a:t>
+              <a:t>Pengcheng Xin</a:t>
             </a:r>
           </a:p>
         </p:txBody>
@@ -4549,7 +4548,7 @@
                   <a:schemeClr val="bg1"/>
                 </a:solidFill>
               </a:rPr>
-              <a:t>Cadence Innovation Conference</a:t>
+              <a:t>ADE Copilot</a:t>
             </a:r>
           </a:p>
         </p:txBody>
@@ -4638,6 +4637,13 @@
               <a:t>How ADE Copilot solves this problem</a:t>
             </a:r>
           </a:p>
+          <a:p>
+            <a:pPr lvl="1"/>
+            <a:r>
+              <a:rPr lang="en-US" dirty="0"/>
+              <a:t>Get the optimal settings for job policy</a:t>
+            </a:r>
+          </a:p>
         </p:txBody>
       </p:sp>
       <p:pic>
@@ -4669,7 +4675,7 @@
         </p:blipFill>
         <p:spPr bwMode="auto">
           <a:xfrm>
-            <a:off x="4557155" y="1538385"/>
+            <a:off x="4590840" y="1631162"/>
             <a:ext cx="2600325" cy="2600325"/>
           </a:xfrm>
           <a:prstGeom prst="rect">
@@ -4746,7 +4752,7 @@
         </p:blipFill>
         <p:spPr bwMode="auto">
           <a:xfrm>
-            <a:off x="669482" y="1726565"/>
+            <a:off x="667557" y="1871351"/>
             <a:ext cx="2647950" cy="2295525"/>
           </a:xfrm>
           <a:prstGeom prst="rect">
@@ -4913,7 +4919,7 @@
         </p:nvSpPr>
         <p:spPr>
           <a:xfrm>
-            <a:off x="7157480" y="2704526"/>
+            <a:off x="7160401" y="2849910"/>
             <a:ext cx="1036949" cy="367645"/>
           </a:xfrm>
           <a:prstGeom prst="rightArrow">
@@ -4949,7 +4955,7 @@
           <a:lstStyle/>
           <a:p>
             <a:pPr algn="ctr"/>
-            <a:endParaRPr lang="en-US"/>
+            <a:endParaRPr lang="en-US" dirty="0"/>
           </a:p>
         </p:txBody>
       </p:sp>
@@ -5131,7 +5137,7 @@
         </p:nvSpPr>
         <p:spPr>
           <a:xfrm>
-            <a:off x="852404" y="4006199"/>
+            <a:off x="936938" y="4060905"/>
             <a:ext cx="1922321" cy="369332"/>
           </a:xfrm>
           <a:prstGeom prst="rect">
@@ -5169,7 +5175,7 @@
         </p:nvSpPr>
         <p:spPr>
           <a:xfrm>
-            <a:off x="4641852" y="3742441"/>
+            <a:off x="4644982" y="3799810"/>
             <a:ext cx="2450351" cy="369332"/>
           </a:xfrm>
           <a:prstGeom prst="rect">
@@ -5297,86 +5303,6 @@
 </file>
 
 <file path=ppt/slides/slide11.xml><?xml version="1.0" encoding="utf-8"?>
-<p:sld xmlns:a="http://schemas.openxmlformats.org/drawingml/2006/main" xmlns:r="http://schemas.openxmlformats.org/officeDocument/2006/relationships" xmlns:p="http://schemas.openxmlformats.org/presentationml/2006/main">
-  <p:cSld>
-    <p:spTree>
-      <p:nvGrpSpPr>
-        <p:cNvPr id="1" name=""/>
-        <p:cNvGrpSpPr/>
-        <p:nvPr/>
-      </p:nvGrpSpPr>
-      <p:grpSpPr>
-        <a:xfrm>
-          <a:off x="0" y="0"/>
-          <a:ext cx="0" cy="0"/>
-          <a:chOff x="0" y="0"/>
-          <a:chExt cx="0" cy="0"/>
-        </a:xfrm>
-      </p:grpSpPr>
-      <p:sp>
-        <p:nvSpPr>
-          <p:cNvPr id="2" name="Title 1">
-            <a:extLst>
-              <a:ext uri="{FF2B5EF4-FFF2-40B4-BE49-F238E27FC236}">
-                <a16:creationId xmlns:a16="http://schemas.microsoft.com/office/drawing/2014/main" id="{90F4D452-8EBB-632F-F5A9-0A1EC3C5BA6D}"/>
-              </a:ext>
-            </a:extLst>
-          </p:cNvPr>
-          <p:cNvSpPr>
-            <a:spLocks noGrp="1"/>
-          </p:cNvSpPr>
-          <p:nvPr>
-            <p:ph type="title"/>
-          </p:nvPr>
-        </p:nvSpPr>
-        <p:spPr/>
-        <p:txBody>
-          <a:bodyPr/>
-          <a:lstStyle/>
-          <a:p>
-            <a:endParaRPr lang="en-US" dirty="0"/>
-          </a:p>
-        </p:txBody>
-      </p:sp>
-      <p:sp>
-        <p:nvSpPr>
-          <p:cNvPr id="3" name="Text Placeholder 2">
-            <a:extLst>
-              <a:ext uri="{FF2B5EF4-FFF2-40B4-BE49-F238E27FC236}">
-                <a16:creationId xmlns:a16="http://schemas.microsoft.com/office/drawing/2014/main" id="{BBA55C93-B9B6-1CDC-DAC5-98B202818C4F}"/>
-              </a:ext>
-            </a:extLst>
-          </p:cNvPr>
-          <p:cNvSpPr>
-            <a:spLocks noGrp="1"/>
-          </p:cNvSpPr>
-          <p:nvPr>
-            <p:ph type="body" idx="1"/>
-          </p:nvPr>
-        </p:nvSpPr>
-        <p:spPr/>
-        <p:txBody>
-          <a:bodyPr/>
-          <a:lstStyle/>
-          <a:p>
-            <a:endParaRPr lang="en-US"/>
-          </a:p>
-        </p:txBody>
-      </p:sp>
-    </p:spTree>
-    <p:extLst>
-      <p:ext uri="{BB962C8B-B14F-4D97-AF65-F5344CB8AC3E}">
-        <p14:creationId xmlns:p14="http://schemas.microsoft.com/office/powerpoint/2010/main" val="1957047950"/>
-      </p:ext>
-    </p:extLst>
-  </p:cSld>
-  <p:clrMapOvr>
-    <a:masterClrMapping/>
-  </p:clrMapOvr>
-</p:sld>
-</file>
-
-<file path=ppt/slides/slide12.xml><?xml version="1.0" encoding="utf-8"?>
 <p:sld xmlns:a="http://schemas.openxmlformats.org/drawingml/2006/main" xmlns:r="http://schemas.openxmlformats.org/officeDocument/2006/relationships" xmlns:p="http://schemas.openxmlformats.org/presentationml/2006/main">
   <p:cSld>
     <p:spTree>
@@ -5453,10 +5379,10 @@
       </p:sp>
       <p:pic>
         <p:nvPicPr>
-          <p:cNvPr id="2" name="Picture 1">
+          <p:cNvPr id="12" name="Picture 11">
             <a:extLst>
               <a:ext uri="{FF2B5EF4-FFF2-40B4-BE49-F238E27FC236}">
-                <a16:creationId xmlns:a16="http://schemas.microsoft.com/office/drawing/2014/main" id="{8E604AE0-51E6-748E-86B8-DB514394D313}"/>
+                <a16:creationId xmlns:a16="http://schemas.microsoft.com/office/drawing/2014/main" id="{088BD5F9-3577-5F8D-AC33-BBFEB842E8BB}"/>
               </a:ext>
             </a:extLst>
           </p:cNvPr>
@@ -5479,8 +5405,8 @@
         </p:blipFill>
         <p:spPr>
           <a:xfrm>
-            <a:off x="1266726" y="930275"/>
-            <a:ext cx="9658547" cy="5569143"/>
+            <a:off x="1211039" y="930275"/>
+            <a:ext cx="10083427" cy="5814130"/>
           </a:xfrm>
           <a:prstGeom prst="rect">
             <a:avLst/>
@@ -5674,6 +5600,9 @@
           <a:p>
             <a:r>
               <a:rPr lang="en-US" sz="1600" b="1" dirty="0">
+                <a:solidFill>
+                  <a:srgbClr val="93DA49"/>
+                </a:solidFill>
                 <a:latin typeface="Times New Roman" panose="02020603050405020304" pitchFamily="18" charset="0"/>
                 <a:cs typeface="Times New Roman" panose="02020603050405020304" pitchFamily="18" charset="0"/>
               </a:rPr>
@@ -5748,6 +5677,9 @@
           <a:p>
             <a:r>
               <a:rPr lang="en-US" sz="1600" b="1" dirty="0">
+                <a:solidFill>
+                  <a:srgbClr val="93DA49"/>
+                </a:solidFill>
                 <a:latin typeface="Times New Roman" panose="02020603050405020304" pitchFamily="18" charset="0"/>
                 <a:cs typeface="Times New Roman" panose="02020603050405020304" pitchFamily="18" charset="0"/>
               </a:rPr>
@@ -5755,6 +5687,9 @@
             </a:r>
             <a:r>
               <a:rPr lang="en-US" altLang="zh-CN" sz="1600" b="1" dirty="0">
+                <a:solidFill>
+                  <a:srgbClr val="93DA49"/>
+                </a:solidFill>
                 <a:latin typeface="Times New Roman" panose="02020603050405020304" pitchFamily="18" charset="0"/>
                 <a:cs typeface="Times New Roman" panose="02020603050405020304" pitchFamily="18" charset="0"/>
               </a:rPr>
@@ -5762,6 +5697,9 @@
             </a:r>
             <a:r>
               <a:rPr lang="en-US" sz="1600" b="1" dirty="0">
+                <a:solidFill>
+                  <a:srgbClr val="93DA49"/>
+                </a:solidFill>
                 <a:latin typeface="Times New Roman" panose="02020603050405020304" pitchFamily="18" charset="0"/>
                 <a:cs typeface="Times New Roman" panose="02020603050405020304" pitchFamily="18" charset="0"/>
               </a:rPr>
@@ -6017,7 +5955,7 @@
           <p:nvPr>
             <p:extLst>
               <p:ext uri="{D42A27DB-BD31-4B8C-83A1-F6EECF244321}">
-                <p14:modId xmlns:p14="http://schemas.microsoft.com/office/powerpoint/2010/main" val="469362079"/>
+                <p14:modId xmlns:p14="http://schemas.microsoft.com/office/powerpoint/2010/main" val="916899997"/>
               </p:ext>
             </p:extLst>
           </p:nvPr>
@@ -6105,6 +6043,26 @@
                     </a:p>
                   </a:txBody>
                   <a:tcPr marL="4945" marR="4945" marT="4945" marB="0" anchor="b">
+                    <a:lnL w="12700" cmpd="sng">
+                      <a:noFill/>
+                    </a:lnL>
+                    <a:lnR w="12700" cmpd="sng">
+                      <a:noFill/>
+                    </a:lnR>
+                    <a:lnT w="12700" cmpd="sng">
+                      <a:noFill/>
+                    </a:lnT>
+                    <a:lnB w="12700" cmpd="sng">
+                      <a:noFill/>
+                    </a:lnB>
+                    <a:lnTlToBr w="12700" cmpd="sng">
+                      <a:noFill/>
+                      <a:prstDash val="solid"/>
+                    </a:lnTlToBr>
+                    <a:lnBlToTr w="12700" cmpd="sng">
+                      <a:noFill/>
+                      <a:prstDash val="solid"/>
+                    </a:lnBlToTr>
                     <a:solidFill>
                       <a:srgbClr val="0070C0"/>
                     </a:solidFill>
@@ -6138,6 +6096,9 @@
                     </a:p>
                   </a:txBody>
                   <a:tcPr marL="4945" marR="4945" marT="4945" marB="0" anchor="b">
+                    <a:lnL w="12700" cmpd="sng">
+                      <a:noFill/>
+                    </a:lnL>
                     <a:solidFill>
                       <a:srgbClr val="0070C0"/>
                     </a:solidFill>
@@ -6204,6 +6165,15 @@
                     </a:p>
                   </a:txBody>
                   <a:tcPr marL="4945" marR="4945" marT="4945" marB="0" anchor="b">
+                    <a:lnR w="12700" cap="flat" cmpd="sng" algn="ctr">
+                      <a:solidFill>
+                        <a:schemeClr val="tx1"/>
+                      </a:solidFill>
+                      <a:prstDash val="solid"/>
+                      <a:round/>
+                      <a:headEnd type="none" w="med" len="med"/>
+                      <a:tailEnd type="none" w="med" len="med"/>
+                    </a:lnR>
                     <a:solidFill>
                       <a:srgbClr val="0070C0"/>
                     </a:solidFill>
@@ -6237,6 +6207,33 @@
                     </a:p>
                   </a:txBody>
                   <a:tcPr marL="4945" marR="4945" marT="4945" marB="0" anchor="b">
+                    <a:lnL w="12700" cap="flat" cmpd="sng" algn="ctr">
+                      <a:solidFill>
+                        <a:schemeClr val="tx1"/>
+                      </a:solidFill>
+                      <a:prstDash val="solid"/>
+                      <a:round/>
+                      <a:headEnd type="none" w="med" len="med"/>
+                      <a:tailEnd type="none" w="med" len="med"/>
+                    </a:lnL>
+                    <a:lnR w="12700" cap="flat" cmpd="sng" algn="ctr">
+                      <a:solidFill>
+                        <a:schemeClr val="tx1"/>
+                      </a:solidFill>
+                      <a:prstDash val="solid"/>
+                      <a:round/>
+                      <a:headEnd type="none" w="med" len="med"/>
+                      <a:tailEnd type="none" w="med" len="med"/>
+                    </a:lnR>
+                    <a:lnT w="12700" cap="flat" cmpd="sng" algn="ctr">
+                      <a:solidFill>
+                        <a:schemeClr val="tx1"/>
+                      </a:solidFill>
+                      <a:prstDash val="solid"/>
+                      <a:round/>
+                      <a:headEnd type="none" w="med" len="med"/>
+                      <a:tailEnd type="none" w="med" len="med"/>
+                    </a:lnT>
                     <a:solidFill>
                       <a:srgbClr val="0070C0"/>
                     </a:solidFill>
@@ -6270,6 +6267,15 @@
                     </a:p>
                   </a:txBody>
                   <a:tcPr marL="4945" marR="4945" marT="4945" marB="0" anchor="b">
+                    <a:lnL w="12700" cap="flat" cmpd="sng" algn="ctr">
+                      <a:solidFill>
+                        <a:schemeClr val="tx1"/>
+                      </a:solidFill>
+                      <a:prstDash val="solid"/>
+                      <a:round/>
+                      <a:headEnd type="none" w="med" len="med"/>
+                      <a:tailEnd type="none" w="med" len="med"/>
+                    </a:lnL>
                     <a:solidFill>
                       <a:srgbClr val="0070C0"/>
                     </a:solidFill>
@@ -6303,7 +6309,11 @@
                       </a:endParaRPr>
                     </a:p>
                   </a:txBody>
-                  <a:tcPr marL="4945" marR="4945" marT="4945" marB="0" anchor="b"/>
+                  <a:tcPr marL="4945" marR="4945" marT="4945" marB="0" anchor="b">
+                    <a:lnT w="12700" cmpd="sng">
+                      <a:noFill/>
+                    </a:lnT>
+                  </a:tcPr>
                 </a:tc>
                 <a:tc>
                   <a:txBody>
@@ -6375,7 +6385,17 @@
                       </a:endParaRPr>
                     </a:p>
                   </a:txBody>
-                  <a:tcPr marL="4945" marR="4945" marT="4945" marB="0" anchor="b"/>
+                  <a:tcPr marL="4945" marR="4945" marT="4945" marB="0" anchor="b">
+                    <a:lnR w="12700" cap="flat" cmpd="sng" algn="ctr">
+                      <a:solidFill>
+                        <a:schemeClr val="tx1"/>
+                      </a:solidFill>
+                      <a:prstDash val="solid"/>
+                      <a:round/>
+                      <a:headEnd type="none" w="med" len="med"/>
+                      <a:tailEnd type="none" w="med" len="med"/>
+                    </a:lnR>
+                  </a:tcPr>
                 </a:tc>
                 <a:tc>
                   <a:txBody>
@@ -6476,7 +6496,26 @@
                       </a:endParaRPr>
                     </a:p>
                   </a:txBody>
-                  <a:tcPr marL="4945" marR="4945" marT="4945" marB="0" anchor="b"/>
+                  <a:tcPr marL="4945" marR="4945" marT="4945" marB="0" anchor="b">
+                    <a:lnL w="12700" cap="flat" cmpd="sng" algn="ctr">
+                      <a:solidFill>
+                        <a:schemeClr val="tx1"/>
+                      </a:solidFill>
+                      <a:prstDash val="solid"/>
+                      <a:round/>
+                      <a:headEnd type="none" w="med" len="med"/>
+                      <a:tailEnd type="none" w="med" len="med"/>
+                    </a:lnL>
+                    <a:lnR w="12700" cap="flat" cmpd="sng" algn="ctr">
+                      <a:solidFill>
+                        <a:schemeClr val="tx1"/>
+                      </a:solidFill>
+                      <a:prstDash val="solid"/>
+                      <a:round/>
+                      <a:headEnd type="none" w="med" len="med"/>
+                      <a:tailEnd type="none" w="med" len="med"/>
+                    </a:lnR>
+                  </a:tcPr>
                 </a:tc>
                 <a:tc>
                   <a:txBody>
@@ -6499,7 +6538,17 @@
                       </a:endParaRPr>
                     </a:p>
                   </a:txBody>
-                  <a:tcPr marL="4945" marR="4945" marT="4945" marB="0" anchor="b"/>
+                  <a:tcPr marL="4945" marR="4945" marT="4945" marB="0" anchor="b">
+                    <a:lnL w="12700" cap="flat" cmpd="sng" algn="ctr">
+                      <a:solidFill>
+                        <a:schemeClr val="tx1"/>
+                      </a:solidFill>
+                      <a:prstDash val="solid"/>
+                      <a:round/>
+                      <a:headEnd type="none" w="med" len="med"/>
+                      <a:tailEnd type="none" w="med" len="med"/>
+                    </a:lnL>
+                  </a:tcPr>
                 </a:tc>
                 <a:extLst>
                   <a:ext uri="{0D108BD9-81ED-4DB2-BD59-A6C34878D82A}">
@@ -6607,7 +6656,17 @@
                       </a:endParaRPr>
                     </a:p>
                   </a:txBody>
-                  <a:tcPr marL="4945" marR="4945" marT="4945" marB="0" anchor="b"/>
+                  <a:tcPr marL="4945" marR="4945" marT="4945" marB="0" anchor="b">
+                    <a:lnR w="12700" cap="flat" cmpd="sng" algn="ctr">
+                      <a:solidFill>
+                        <a:schemeClr val="tx1"/>
+                      </a:solidFill>
+                      <a:prstDash val="solid"/>
+                      <a:round/>
+                      <a:headEnd type="none" w="med" len="med"/>
+                      <a:tailEnd type="none" w="med" len="med"/>
+                    </a:lnR>
+                  </a:tcPr>
                 </a:tc>
                 <a:tc>
                   <a:txBody>
@@ -6648,7 +6707,26 @@
                       </a:endParaRPr>
                     </a:p>
                   </a:txBody>
-                  <a:tcPr marL="4945" marR="4945" marT="4945" marB="0" anchor="b"/>
+                  <a:tcPr marL="4945" marR="4945" marT="4945" marB="0" anchor="b">
+                    <a:lnL w="12700" cap="flat" cmpd="sng" algn="ctr">
+                      <a:solidFill>
+                        <a:schemeClr val="tx1"/>
+                      </a:solidFill>
+                      <a:prstDash val="solid"/>
+                      <a:round/>
+                      <a:headEnd type="none" w="med" len="med"/>
+                      <a:tailEnd type="none" w="med" len="med"/>
+                    </a:lnL>
+                    <a:lnR w="12700" cap="flat" cmpd="sng" algn="ctr">
+                      <a:solidFill>
+                        <a:schemeClr val="tx1"/>
+                      </a:solidFill>
+                      <a:prstDash val="solid"/>
+                      <a:round/>
+                      <a:headEnd type="none" w="med" len="med"/>
+                      <a:tailEnd type="none" w="med" len="med"/>
+                    </a:lnR>
+                  </a:tcPr>
                 </a:tc>
                 <a:tc>
                   <a:txBody>
@@ -6671,7 +6749,17 @@
                       </a:endParaRPr>
                     </a:p>
                   </a:txBody>
-                  <a:tcPr marL="4945" marR="4945" marT="4945" marB="0" anchor="b"/>
+                  <a:tcPr marL="4945" marR="4945" marT="4945" marB="0" anchor="b">
+                    <a:lnL w="12700" cap="flat" cmpd="sng" algn="ctr">
+                      <a:solidFill>
+                        <a:schemeClr val="tx1"/>
+                      </a:solidFill>
+                      <a:prstDash val="solid"/>
+                      <a:round/>
+                      <a:headEnd type="none" w="med" len="med"/>
+                      <a:tailEnd type="none" w="med" len="med"/>
+                    </a:lnL>
+                  </a:tcPr>
                 </a:tc>
                 <a:extLst>
                   <a:ext uri="{0D108BD9-81ED-4DB2-BD59-A6C34878D82A}">
@@ -6774,7 +6862,17 @@
                       </a:r>
                     </a:p>
                   </a:txBody>
-                  <a:tcPr marL="4945" marR="4945" marT="4945" marB="0" anchor="b"/>
+                  <a:tcPr marL="4945" marR="4945" marT="4945" marB="0" anchor="b">
+                    <a:lnR w="12700" cap="flat" cmpd="sng" algn="ctr">
+                      <a:solidFill>
+                        <a:schemeClr val="tx1"/>
+                      </a:solidFill>
+                      <a:prstDash val="solid"/>
+                      <a:round/>
+                      <a:headEnd type="none" w="med" len="med"/>
+                      <a:tailEnd type="none" w="med" len="med"/>
+                    </a:lnR>
+                  </a:tcPr>
                 </a:tc>
                 <a:tc>
                   <a:txBody>
@@ -6800,7 +6898,33 @@
                       </a:endParaRPr>
                     </a:p>
                   </a:txBody>
-                  <a:tcPr marL="4945" marR="4945" marT="4945" marB="0" anchor="b"/>
+                  <a:tcPr marL="4945" marR="4945" marT="4945" marB="0" anchor="b">
+                    <a:lnL w="12700" cap="flat" cmpd="sng" algn="ctr">
+                      <a:solidFill>
+                        <a:schemeClr val="tx1"/>
+                      </a:solidFill>
+                      <a:prstDash val="solid"/>
+                      <a:round/>
+                      <a:headEnd type="none" w="med" len="med"/>
+                      <a:tailEnd type="none" w="med" len="med"/>
+                    </a:lnL>
+                    <a:lnR w="12700" cap="flat" cmpd="sng" algn="ctr">
+                      <a:solidFill>
+                        <a:schemeClr val="tx1"/>
+                      </a:solidFill>
+                      <a:prstDash val="solid"/>
+                      <a:round/>
+                      <a:headEnd type="none" w="med" len="med"/>
+                      <a:tailEnd type="none" w="med" len="med"/>
+                    </a:lnR>
+                    <a:lnB w="12700" cap="flat" cmpd="sng" algn="ctr">
+                      <a:noFill/>
+                      <a:prstDash val="solid"/>
+                      <a:round/>
+                      <a:headEnd type="none" w="med" len="med"/>
+                      <a:tailEnd type="none" w="med" len="med"/>
+                    </a:lnB>
+                  </a:tcPr>
                 </a:tc>
                 <a:tc>
                   <a:txBody>
@@ -6821,7 +6945,17 @@
                       </a:r>
                     </a:p>
                   </a:txBody>
-                  <a:tcPr marL="4945" marR="4945" marT="4945" marB="0" anchor="b"/>
+                  <a:tcPr marL="4945" marR="4945" marT="4945" marB="0" anchor="b">
+                    <a:lnL w="12700" cap="flat" cmpd="sng" algn="ctr">
+                      <a:solidFill>
+                        <a:schemeClr val="tx1"/>
+                      </a:solidFill>
+                      <a:prstDash val="solid"/>
+                      <a:round/>
+                      <a:headEnd type="none" w="med" len="med"/>
+                      <a:tailEnd type="none" w="med" len="med"/>
+                    </a:lnL>
+                  </a:tcPr>
                 </a:tc>
                 <a:extLst>
                   <a:ext uri="{0D108BD9-81ED-4DB2-BD59-A6C34878D82A}">
@@ -7009,7 +7143,7 @@
         </p:nvSpPr>
         <p:spPr>
           <a:xfrm>
-            <a:off x="1051084" y="5836376"/>
+            <a:off x="1234050" y="5765361"/>
             <a:ext cx="1798506" cy="369332"/>
           </a:xfrm>
           <a:prstGeom prst="rect">
@@ -7156,8 +7290,8 @@
         </p:nvSpPr>
         <p:spPr>
           <a:xfrm>
-            <a:off x="7871312" y="2574287"/>
-            <a:ext cx="3002605" cy="246221"/>
+            <a:off x="7577172" y="2634518"/>
+            <a:ext cx="3789645" cy="246221"/>
           </a:xfrm>
           <a:prstGeom prst="rect">
             <a:avLst/>
@@ -7175,7 +7309,7 @@
                 <a:latin typeface="Times New Roman" panose="02020603050405020304" pitchFamily="18" charset="0"/>
                 <a:cs typeface="Times New Roman" panose="02020603050405020304" pitchFamily="18" charset="0"/>
               </a:rPr>
-              <a:t>Natural Language Processing  And Skill Generation</a:t>
+              <a:t>Natural Language Processing  And Skill expression Generation</a:t>
             </a:r>
           </a:p>
         </p:txBody>
@@ -7195,7 +7329,7 @@
         <p:spPr>
           <a:xfrm>
             <a:off x="8596244" y="3404875"/>
-            <a:ext cx="1212896" cy="369332"/>
+            <a:ext cx="943592" cy="369332"/>
           </a:xfrm>
           <a:prstGeom prst="rect">
             <a:avLst/>
@@ -7216,8 +7350,60 @@
                 <a:latin typeface="Times New Roman" panose="02020603050405020304" pitchFamily="18" charset="0"/>
                 <a:cs typeface="Times New Roman" panose="02020603050405020304" pitchFamily="18" charset="0"/>
               </a:rPr>
-              <a:t>LLM Way</a:t>
-            </a:r>
+              <a:t>AI Way</a:t>
+            </a:r>
+          </a:p>
+        </p:txBody>
+      </p:sp>
+      <p:sp>
+        <p:nvSpPr>
+          <p:cNvPr id="2" name="Rectangle 1">
+            <a:extLst>
+              <a:ext uri="{FF2B5EF4-FFF2-40B4-BE49-F238E27FC236}">
+                <a16:creationId xmlns:a16="http://schemas.microsoft.com/office/drawing/2014/main" id="{06C84EF7-6772-A207-FDE8-A94C661B69F5}"/>
+              </a:ext>
+            </a:extLst>
+          </p:cNvPr>
+          <p:cNvSpPr/>
+          <p:nvPr/>
+        </p:nvSpPr>
+        <p:spPr>
+          <a:xfrm>
+            <a:off x="4807670" y="1906624"/>
+            <a:ext cx="1637153" cy="2474862"/>
+          </a:xfrm>
+          <a:prstGeom prst="rect">
+            <a:avLst/>
+          </a:prstGeom>
+          <a:noFill/>
+          <a:ln w="38100">
+            <a:solidFill>
+              <a:schemeClr val="accent6"/>
+            </a:solidFill>
+          </a:ln>
+        </p:spPr>
+        <p:style>
+          <a:lnRef idx="2">
+            <a:schemeClr val="accent1">
+              <a:shade val="50000"/>
+            </a:schemeClr>
+          </a:lnRef>
+          <a:fillRef idx="1">
+            <a:schemeClr val="accent1"/>
+          </a:fillRef>
+          <a:effectRef idx="0">
+            <a:schemeClr val="accent1"/>
+          </a:effectRef>
+          <a:fontRef idx="minor">
+            <a:schemeClr val="lt1"/>
+          </a:fontRef>
+        </p:style>
+        <p:txBody>
+          <a:bodyPr rtlCol="0" anchor="ctr"/>
+          <a:lstStyle/>
+          <a:p>
+            <a:pPr algn="ctr"/>
+            <a:endParaRPr lang="en-US"/>
           </a:p>
         </p:txBody>
       </p:sp>
@@ -7334,7 +7520,7 @@
           <p:nvPr>
             <p:extLst>
               <p:ext uri="{D42A27DB-BD31-4B8C-83A1-F6EECF244321}">
-                <p14:modId xmlns:p14="http://schemas.microsoft.com/office/powerpoint/2010/main" val="3369417816"/>
+                <p14:modId xmlns:p14="http://schemas.microsoft.com/office/powerpoint/2010/main" val="2147498445"/>
               </p:ext>
             </p:extLst>
           </p:nvPr>
@@ -7566,7 +7752,7 @@
                           <a:ea typeface="+mn-ea"/>
                           <a:cs typeface="+mn-cs"/>
                         </a:rPr>
-                        <a:t>4</a:t>
+                        <a:t>…</a:t>
                       </a:r>
                     </a:p>
                   </a:txBody>
@@ -7618,7 +7804,7 @@
           <p:nvPr>
             <p:extLst>
               <p:ext uri="{D42A27DB-BD31-4B8C-83A1-F6EECF244321}">
-                <p14:modId xmlns:p14="http://schemas.microsoft.com/office/powerpoint/2010/main" val="1424738020"/>
+                <p14:modId xmlns:p14="http://schemas.microsoft.com/office/powerpoint/2010/main" val="2576568371"/>
               </p:ext>
             </p:extLst>
           </p:nvPr>
@@ -7922,7 +8108,7 @@
                           <a:ea typeface="+mn-ea"/>
                           <a:cs typeface="+mn-cs"/>
                         </a:rPr>
-                        <a:t>4</a:t>
+                        <a:t>…</a:t>
                       </a:r>
                     </a:p>
                   </a:txBody>
@@ -8297,108 +8483,460 @@
           <a:p>
             <a:pPr lvl="1"/>
             <a:r>
+              <a:rPr lang="en-US" altLang="zh-CN" dirty="0"/>
+              <a:t>Task analysis</a:t>
+            </a:r>
+            <a:r>
               <a:rPr lang="en-US" dirty="0"/>
-              <a:t>NLP and </a:t>
+              <a:t> and </a:t>
             </a:r>
             <a:r>
               <a:rPr lang="en-US" altLang="zh-CN" dirty="0"/>
-              <a:t>skill code generation</a:t>
+              <a:t>measurement generation</a:t>
             </a:r>
             <a:endParaRPr lang="en-US" dirty="0"/>
           </a:p>
         </p:txBody>
       </p:sp>
-      <p:pic>
-        <p:nvPicPr>
-          <p:cNvPr id="5" name="Picture 2">
+      <p:graphicFrame>
+        <p:nvGraphicFramePr>
+          <p:cNvPr id="6" name="Table 6">
             <a:extLst>
               <a:ext uri="{FF2B5EF4-FFF2-40B4-BE49-F238E27FC236}">
-                <a16:creationId xmlns:a16="http://schemas.microsoft.com/office/drawing/2014/main" id="{D1CE5286-7072-7B7E-8162-65D1E0749A4A}"/>
+                <a16:creationId xmlns:a16="http://schemas.microsoft.com/office/drawing/2014/main" id="{435EB0BC-2D6D-60E2-8E77-248BEDBEFA4B}"/>
               </a:ext>
             </a:extLst>
           </p:cNvPr>
-          <p:cNvPicPr>
-            <a:picLocks noChangeAspect="1" noChangeArrowheads="1"/>
-          </p:cNvPicPr>
-          <p:nvPr/>
-        </p:nvPicPr>
-        <p:blipFill>
-          <a:blip r:embed="rId2" cstate="print">
-            <a:extLst>
-              <a:ext uri="{28A0092B-C50C-407E-A947-70E740481C1C}">
-                <a14:useLocalDpi xmlns:a14="http://schemas.microsoft.com/office/drawing/2010/main" val="0"/>
-              </a:ext>
-            </a:extLst>
-          </a:blip>
-          <a:srcRect/>
-          <a:stretch>
-            <a:fillRect/>
-          </a:stretch>
-        </p:blipFill>
-        <p:spPr bwMode="auto">
-          <a:xfrm>
-            <a:off x="8571632" y="2523043"/>
-            <a:ext cx="2472503" cy="2472503"/>
-          </a:xfrm>
-          <a:prstGeom prst="rect">
-            <a:avLst/>
-          </a:prstGeom>
-          <a:noFill/>
-          <a:extLst>
-            <a:ext uri="{909E8E84-426E-40DD-AFC4-6F175D3DCCD1}">
-              <a14:hiddenFill xmlns:a14="http://schemas.microsoft.com/office/drawing/2010/main">
-                <a:solidFill>
-                  <a:srgbClr val="FFFFFF"/>
-                </a:solidFill>
-              </a14:hiddenFill>
-            </a:ext>
-          </a:extLst>
-        </p:spPr>
-      </p:pic>
+          <p:cNvGraphicFramePr>
+            <a:graphicFrameLocks noGrp="1"/>
+          </p:cNvGraphicFramePr>
+          <p:nvPr>
+            <p:extLst>
+              <p:ext uri="{D42A27DB-BD31-4B8C-83A1-F6EECF244321}">
+                <p14:modId xmlns:p14="http://schemas.microsoft.com/office/powerpoint/2010/main" val="2226357739"/>
+              </p:ext>
+            </p:extLst>
+          </p:nvPr>
+        </p:nvGraphicFramePr>
+        <p:xfrm>
+          <a:off x="435430" y="2723410"/>
+          <a:ext cx="3151832" cy="2565400"/>
+        </p:xfrm>
+        <a:graphic>
+          <a:graphicData uri="http://schemas.openxmlformats.org/drawingml/2006/table">
+            <a:tbl>
+              <a:tblPr firstRow="1" bandRow="1">
+                <a:tableStyleId>{5C22544A-7EE6-4342-B048-85BDC9FD1C3A}</a:tableStyleId>
+              </a:tblPr>
+              <a:tblGrid>
+                <a:gridCol w="427884">
+                  <a:extLst>
+                    <a:ext uri="{9D8B030D-6E8A-4147-A177-3AD203B41FA5}">
+                      <a16:colId xmlns:a16="http://schemas.microsoft.com/office/drawing/2014/main" val="1900746793"/>
+                    </a:ext>
+                  </a:extLst>
+                </a:gridCol>
+                <a:gridCol w="2723948">
+                  <a:extLst>
+                    <a:ext uri="{9D8B030D-6E8A-4147-A177-3AD203B41FA5}">
+                      <a16:colId xmlns:a16="http://schemas.microsoft.com/office/drawing/2014/main" val="3790268417"/>
+                    </a:ext>
+                  </a:extLst>
+                </a:gridCol>
+              </a:tblGrid>
+              <a:tr h="217881">
+                <a:tc>
+                  <a:txBody>
+                    <a:bodyPr/>
+                    <a:lstStyle/>
+                    <a:p>
+                      <a:pPr algn="ctr"/>
+                      <a:r>
+                        <a:rPr lang="en-US"/>
+                        <a:t>ID</a:t>
+                      </a:r>
+                      <a:endParaRPr lang="en-US" dirty="0"/>
+                    </a:p>
+                  </a:txBody>
+                  <a:tcPr/>
+                </a:tc>
+                <a:tc>
+                  <a:txBody>
+                    <a:bodyPr/>
+                    <a:lstStyle/>
+                    <a:p>
+                      <a:pPr algn="ctr"/>
+                      <a:r>
+                        <a:rPr lang="en-US" dirty="0"/>
+                        <a:t>Requirements</a:t>
+                      </a:r>
+                    </a:p>
+                  </a:txBody>
+                  <a:tcPr/>
+                </a:tc>
+                <a:extLst>
+                  <a:ext uri="{0D108BD9-81ED-4DB2-BD59-A6C34878D82A}">
+                    <a16:rowId xmlns:a16="http://schemas.microsoft.com/office/drawing/2014/main" val="1158463288"/>
+                  </a:ext>
+                </a:extLst>
+              </a:tr>
+              <a:tr h="370840">
+                <a:tc>
+                  <a:txBody>
+                    <a:bodyPr/>
+                    <a:lstStyle/>
+                    <a:p>
+                      <a:pPr algn="ctr"/>
+                      <a:r>
+                        <a:rPr lang="en-US" sz="1400" b="0" i="0" kern="1200" dirty="0">
+                          <a:solidFill>
+                            <a:schemeClr val="dk1"/>
+                          </a:solidFill>
+                          <a:effectLst/>
+                          <a:latin typeface="+mn-lt"/>
+                          <a:ea typeface="+mn-ea"/>
+                          <a:cs typeface="+mn-cs"/>
+                        </a:rPr>
+                        <a:t>1</a:t>
+                      </a:r>
+                      <a:endParaRPr lang="en-US" sz="1400" dirty="0"/>
+                    </a:p>
+                  </a:txBody>
+                  <a:tcPr/>
+                </a:tc>
+                <a:tc>
+                  <a:txBody>
+                    <a:bodyPr/>
+                    <a:lstStyle/>
+                    <a:p>
+                      <a:pPr algn="l"/>
+                      <a:r>
+                        <a:rPr lang="en-US" sz="1800" b="0" i="0" kern="1200" dirty="0">
+                          <a:solidFill>
+                            <a:schemeClr val="dk1"/>
+                          </a:solidFill>
+                          <a:effectLst/>
+                          <a:latin typeface="+mn-lt"/>
+                          <a:ea typeface="+mn-ea"/>
+                          <a:cs typeface="+mn-cs"/>
+                        </a:rPr>
+                        <a:t>High pulse width at vdd/2.0 / period</a:t>
+                      </a:r>
+                      <a:endParaRPr lang="en-US" sz="1400" dirty="0"/>
+                    </a:p>
+                  </a:txBody>
+                  <a:tcPr/>
+                </a:tc>
+                <a:extLst>
+                  <a:ext uri="{0D108BD9-81ED-4DB2-BD59-A6C34878D82A}">
+                    <a16:rowId xmlns:a16="http://schemas.microsoft.com/office/drawing/2014/main" val="2955363936"/>
+                  </a:ext>
+                </a:extLst>
+              </a:tr>
+              <a:tr h="370840">
+                <a:tc>
+                  <a:txBody>
+                    <a:bodyPr/>
+                    <a:lstStyle/>
+                    <a:p>
+                      <a:pPr algn="ctr"/>
+                      <a:r>
+                        <a:rPr lang="en-US" sz="1400" dirty="0"/>
+                        <a:t>2</a:t>
+                      </a:r>
+                    </a:p>
+                  </a:txBody>
+                  <a:tcPr/>
+                </a:tc>
+                <a:tc>
+                  <a:txBody>
+                    <a:bodyPr/>
+                    <a:lstStyle/>
+                    <a:p>
+                      <a:pPr algn="l"/>
+                      <a:r>
+                        <a:rPr lang="en-US" sz="1800" b="0" i="0" kern="1200" dirty="0">
+                          <a:solidFill>
+                            <a:schemeClr val="dk1"/>
+                          </a:solidFill>
+                          <a:effectLst/>
+                          <a:latin typeface="+mn-lt"/>
+                          <a:ea typeface="+mn-ea"/>
+                          <a:cs typeface="+mn-cs"/>
+                        </a:rPr>
+                        <a:t>Measure the peak current on each supply</a:t>
+                      </a:r>
+                      <a:br>
+                        <a:rPr lang="en-US" sz="1400" dirty="0"/>
+                      </a:br>
+                      <a:r>
+                        <a:rPr lang="en-US" sz="1800" b="0" i="0" kern="1200" dirty="0">
+                          <a:solidFill>
+                            <a:schemeClr val="dk1"/>
+                          </a:solidFill>
+                          <a:effectLst/>
+                          <a:latin typeface="+mn-lt"/>
+                          <a:ea typeface="+mn-ea"/>
+                          <a:cs typeface="+mn-cs"/>
+                        </a:rPr>
+                        <a:t>and ensure that it meets project targets</a:t>
+                      </a:r>
+                      <a:endParaRPr lang="en-US" sz="1400" dirty="0"/>
+                    </a:p>
+                  </a:txBody>
+                  <a:tcPr/>
+                </a:tc>
+                <a:extLst>
+                  <a:ext uri="{0D108BD9-81ED-4DB2-BD59-A6C34878D82A}">
+                    <a16:rowId xmlns:a16="http://schemas.microsoft.com/office/drawing/2014/main" val="3569874541"/>
+                  </a:ext>
+                </a:extLst>
+              </a:tr>
+              <a:tr h="370840">
+                <a:tc>
+                  <a:txBody>
+                    <a:bodyPr/>
+                    <a:lstStyle/>
+                    <a:p>
+                      <a:pPr algn="ctr"/>
+                      <a:r>
+                        <a:rPr lang="en-US" sz="1400" dirty="0"/>
+                        <a:t>…</a:t>
+                      </a:r>
+                    </a:p>
+                  </a:txBody>
+                  <a:tcPr/>
+                </a:tc>
+                <a:tc>
+                  <a:txBody>
+                    <a:bodyPr/>
+                    <a:lstStyle/>
+                    <a:p>
+                      <a:pPr algn="ctr"/>
+                      <a:r>
+                        <a:rPr lang="en-US" sz="1400" dirty="0"/>
+                        <a:t>…</a:t>
+                      </a:r>
+                    </a:p>
+                  </a:txBody>
+                  <a:tcPr/>
+                </a:tc>
+                <a:extLst>
+                  <a:ext uri="{0D108BD9-81ED-4DB2-BD59-A6C34878D82A}">
+                    <a16:rowId xmlns:a16="http://schemas.microsoft.com/office/drawing/2014/main" val="173256453"/>
+                  </a:ext>
+                </a:extLst>
+              </a:tr>
+            </a:tbl>
+          </a:graphicData>
+        </a:graphic>
+      </p:graphicFrame>
+      <p:graphicFrame>
+        <p:nvGraphicFramePr>
+          <p:cNvPr id="12" name="Table 6">
+            <a:extLst>
+              <a:ext uri="{FF2B5EF4-FFF2-40B4-BE49-F238E27FC236}">
+                <a16:creationId xmlns:a16="http://schemas.microsoft.com/office/drawing/2014/main" id="{A4364B51-E7E9-5889-FDE0-019886B1F9E8}"/>
+              </a:ext>
+            </a:extLst>
+          </p:cNvPr>
+          <p:cNvGraphicFramePr>
+            <a:graphicFrameLocks noGrp="1"/>
+          </p:cNvGraphicFramePr>
+          <p:nvPr>
+            <p:extLst>
+              <p:ext uri="{D42A27DB-BD31-4B8C-83A1-F6EECF244321}">
+                <p14:modId xmlns:p14="http://schemas.microsoft.com/office/powerpoint/2010/main" val="957261442"/>
+              </p:ext>
+            </p:extLst>
+          </p:nvPr>
+        </p:nvGraphicFramePr>
+        <p:xfrm>
+          <a:off x="8090097" y="2954522"/>
+          <a:ext cx="3666474" cy="1838960"/>
+        </p:xfrm>
+        <a:graphic>
+          <a:graphicData uri="http://schemas.openxmlformats.org/drawingml/2006/table">
+            <a:tbl>
+              <a:tblPr firstRow="1" bandRow="1">
+                <a:tableStyleId>{5C22544A-7EE6-4342-B048-85BDC9FD1C3A}</a:tableStyleId>
+              </a:tblPr>
+              <a:tblGrid>
+                <a:gridCol w="497751">
+                  <a:extLst>
+                    <a:ext uri="{9D8B030D-6E8A-4147-A177-3AD203B41FA5}">
+                      <a16:colId xmlns:a16="http://schemas.microsoft.com/office/drawing/2014/main" val="1900746793"/>
+                    </a:ext>
+                  </a:extLst>
+                </a:gridCol>
+                <a:gridCol w="3168723">
+                  <a:extLst>
+                    <a:ext uri="{9D8B030D-6E8A-4147-A177-3AD203B41FA5}">
+                      <a16:colId xmlns:a16="http://schemas.microsoft.com/office/drawing/2014/main" val="3790268417"/>
+                    </a:ext>
+                  </a:extLst>
+                </a:gridCol>
+              </a:tblGrid>
+              <a:tr h="217881">
+                <a:tc>
+                  <a:txBody>
+                    <a:bodyPr/>
+                    <a:lstStyle/>
+                    <a:p>
+                      <a:pPr algn="ctr"/>
+                      <a:r>
+                        <a:rPr lang="en-US"/>
+                        <a:t>ID</a:t>
+                      </a:r>
+                      <a:endParaRPr lang="en-US" dirty="0"/>
+                    </a:p>
+                  </a:txBody>
+                  <a:tcPr/>
+                </a:tc>
+                <a:tc>
+                  <a:txBody>
+                    <a:bodyPr/>
+                    <a:lstStyle/>
+                    <a:p>
+                      <a:pPr algn="ctr"/>
+                      <a:r>
+                        <a:rPr lang="en-US" dirty="0"/>
+                        <a:t>Requirements</a:t>
+                      </a:r>
+                    </a:p>
+                  </a:txBody>
+                  <a:tcPr/>
+                </a:tc>
+                <a:extLst>
+                  <a:ext uri="{0D108BD9-81ED-4DB2-BD59-A6C34878D82A}">
+                    <a16:rowId xmlns:a16="http://schemas.microsoft.com/office/drawing/2014/main" val="1158463288"/>
+                  </a:ext>
+                </a:extLst>
+              </a:tr>
+              <a:tr h="370840">
+                <a:tc>
+                  <a:txBody>
+                    <a:bodyPr/>
+                    <a:lstStyle/>
+                    <a:p>
+                      <a:pPr algn="ctr"/>
+                      <a:r>
+                        <a:rPr lang="en-US" sz="1400" b="0" i="0" kern="1200" dirty="0">
+                          <a:solidFill>
+                            <a:schemeClr val="dk1"/>
+                          </a:solidFill>
+                          <a:effectLst/>
+                          <a:latin typeface="+mn-lt"/>
+                          <a:ea typeface="+mn-ea"/>
+                          <a:cs typeface="+mn-cs"/>
+                        </a:rPr>
+                        <a:t>1</a:t>
+                      </a:r>
+                      <a:endParaRPr lang="en-US" sz="1400" dirty="0"/>
+                    </a:p>
+                  </a:txBody>
+                  <a:tcPr/>
+                </a:tc>
+                <a:tc>
+                  <a:txBody>
+                    <a:bodyPr/>
+                    <a:lstStyle/>
+                    <a:p>
+                      <a:pPr algn="l"/>
+                      <a:r>
+                        <a:rPr lang="en-US" sz="1400" dirty="0"/>
+                        <a:t>fallTime(VT("/net12") 0 nil 0 nil 10 90 nil "time" )-riseTime(VT("/net12") 0 nil 0 nil 10 90 nil "time" )</a:t>
+                      </a:r>
+                    </a:p>
+                  </a:txBody>
+                  <a:tcPr/>
+                </a:tc>
+                <a:extLst>
+                  <a:ext uri="{0D108BD9-81ED-4DB2-BD59-A6C34878D82A}">
+                    <a16:rowId xmlns:a16="http://schemas.microsoft.com/office/drawing/2014/main" val="2955363936"/>
+                  </a:ext>
+                </a:extLst>
+              </a:tr>
+              <a:tr h="370840">
+                <a:tc>
+                  <a:txBody>
+                    <a:bodyPr/>
+                    <a:lstStyle/>
+                    <a:p>
+                      <a:pPr algn="ctr"/>
+                      <a:r>
+                        <a:rPr lang="en-US" sz="1400" dirty="0"/>
+                        <a:t>2</a:t>
+                      </a:r>
+                    </a:p>
+                  </a:txBody>
+                  <a:tcPr/>
+                </a:tc>
+                <a:tc>
+                  <a:txBody>
+                    <a:bodyPr/>
+                    <a:lstStyle/>
+                    <a:p>
+                      <a:pPr algn="l"/>
+                      <a:r>
+                        <a:rPr lang="en-US" sz="1400" dirty="0"/>
+                        <a:t>ymax(IT("/M1/D"))</a:t>
+                      </a:r>
+                    </a:p>
+                  </a:txBody>
+                  <a:tcPr/>
+                </a:tc>
+                <a:extLst>
+                  <a:ext uri="{0D108BD9-81ED-4DB2-BD59-A6C34878D82A}">
+                    <a16:rowId xmlns:a16="http://schemas.microsoft.com/office/drawing/2014/main" val="3569874541"/>
+                  </a:ext>
+                </a:extLst>
+              </a:tr>
+              <a:tr h="370840">
+                <a:tc>
+                  <a:txBody>
+                    <a:bodyPr/>
+                    <a:lstStyle/>
+                    <a:p>
+                      <a:pPr algn="ctr"/>
+                      <a:r>
+                        <a:rPr lang="en-US" sz="1400" dirty="0"/>
+                        <a:t>…</a:t>
+                      </a:r>
+                    </a:p>
+                  </a:txBody>
+                  <a:tcPr/>
+                </a:tc>
+                <a:tc>
+                  <a:txBody>
+                    <a:bodyPr/>
+                    <a:lstStyle/>
+                    <a:p>
+                      <a:pPr algn="ctr"/>
+                      <a:r>
+                        <a:rPr lang="en-US" sz="1400" dirty="0"/>
+                        <a:t>…</a:t>
+                      </a:r>
+                    </a:p>
+                  </a:txBody>
+                  <a:tcPr/>
+                </a:tc>
+                <a:extLst>
+                  <a:ext uri="{0D108BD9-81ED-4DB2-BD59-A6C34878D82A}">
+                    <a16:rowId xmlns:a16="http://schemas.microsoft.com/office/drawing/2014/main" val="173256453"/>
+                  </a:ext>
+                </a:extLst>
+              </a:tr>
+            </a:tbl>
+          </a:graphicData>
+        </a:graphic>
+      </p:graphicFrame>
       <p:sp>
         <p:nvSpPr>
-          <p:cNvPr id="11" name="TextBox 10">
+          <p:cNvPr id="13" name="Arrow: Right 12">
             <a:extLst>
               <a:ext uri="{FF2B5EF4-FFF2-40B4-BE49-F238E27FC236}">
-                <a16:creationId xmlns:a16="http://schemas.microsoft.com/office/drawing/2014/main" id="{193322DE-9807-93FC-701D-824B59AA398F}"/>
-              </a:ext>
-            </a:extLst>
-          </p:cNvPr>
-          <p:cNvSpPr txBox="1"/>
-          <p:nvPr/>
-        </p:nvSpPr>
-        <p:spPr>
-          <a:xfrm>
-            <a:off x="8623328" y="4810880"/>
-            <a:ext cx="2369110" cy="369332"/>
-          </a:xfrm>
-          <a:prstGeom prst="rect">
-            <a:avLst/>
-          </a:prstGeom>
-          <a:noFill/>
-        </p:spPr>
-        <p:txBody>
-          <a:bodyPr wrap="none" rtlCol="0">
-            <a:spAutoFit/>
-          </a:bodyPr>
-          <a:lstStyle/>
-          <a:p>
-            <a:r>
-              <a:rPr lang="en-US" b="1" dirty="0">
-                <a:latin typeface="Times New Roman" panose="02020603050405020304" pitchFamily="18" charset="0"/>
-                <a:cs typeface="Times New Roman" panose="02020603050405020304" pitchFamily="18" charset="0"/>
-              </a:rPr>
-              <a:t>ADE Copilot Training</a:t>
-            </a:r>
-          </a:p>
-        </p:txBody>
-      </p:sp>
-      <p:sp>
-        <p:nvSpPr>
-          <p:cNvPr id="12" name="Arrow: Right 11">
-            <a:extLst>
-              <a:ext uri="{FF2B5EF4-FFF2-40B4-BE49-F238E27FC236}">
-                <a16:creationId xmlns:a16="http://schemas.microsoft.com/office/drawing/2014/main" id="{1F38D297-D29D-52BD-1AC6-95894B185807}"/>
+                <a16:creationId xmlns:a16="http://schemas.microsoft.com/office/drawing/2014/main" id="{94E9AF12-35D6-8DC6-B74E-9ABEFBD1CB9A}"/>
               </a:ext>
             </a:extLst>
           </p:cNvPr>
@@ -8407,15 +8945,16 @@
         </p:nvSpPr>
         <p:spPr>
           <a:xfrm>
-            <a:off x="7232128" y="3755450"/>
-            <a:ext cx="1084083" cy="377072"/>
+            <a:off x="3748035" y="3429000"/>
+            <a:ext cx="462698" cy="333103"/>
           </a:xfrm>
           <a:prstGeom prst="rightArrow">
             <a:avLst/>
           </a:prstGeom>
           <a:solidFill>
-            <a:schemeClr val="bg1">
-              <a:lumMod val="85000"/>
+            <a:schemeClr val="tx1">
+              <a:lumMod val="25000"/>
+              <a:lumOff val="75000"/>
             </a:schemeClr>
           </a:solidFill>
           <a:ln>
@@ -8447,6 +8986,97 @@
           </a:p>
         </p:txBody>
       </p:sp>
+      <p:sp>
+        <p:nvSpPr>
+          <p:cNvPr id="14" name="Arrow: Right 13">
+            <a:extLst>
+              <a:ext uri="{FF2B5EF4-FFF2-40B4-BE49-F238E27FC236}">
+                <a16:creationId xmlns:a16="http://schemas.microsoft.com/office/drawing/2014/main" id="{5D59B80E-0367-CB67-A960-EC9264938E62}"/>
+              </a:ext>
+            </a:extLst>
+          </p:cNvPr>
+          <p:cNvSpPr/>
+          <p:nvPr/>
+        </p:nvSpPr>
+        <p:spPr>
+          <a:xfrm>
+            <a:off x="7466625" y="3429000"/>
+            <a:ext cx="462698" cy="333103"/>
+          </a:xfrm>
+          <a:prstGeom prst="rightArrow">
+            <a:avLst/>
+          </a:prstGeom>
+          <a:solidFill>
+            <a:schemeClr val="tx1">
+              <a:lumMod val="25000"/>
+              <a:lumOff val="75000"/>
+            </a:schemeClr>
+          </a:solidFill>
+          <a:ln>
+            <a:noFill/>
+          </a:ln>
+        </p:spPr>
+        <p:style>
+          <a:lnRef idx="2">
+            <a:schemeClr val="accent1">
+              <a:shade val="50000"/>
+            </a:schemeClr>
+          </a:lnRef>
+          <a:fillRef idx="1">
+            <a:schemeClr val="accent1"/>
+          </a:fillRef>
+          <a:effectRef idx="0">
+            <a:schemeClr val="accent1"/>
+          </a:effectRef>
+          <a:fontRef idx="minor">
+            <a:schemeClr val="lt1"/>
+          </a:fontRef>
+        </p:style>
+        <p:txBody>
+          <a:bodyPr rtlCol="0" anchor="ctr"/>
+          <a:lstStyle/>
+          <a:p>
+            <a:pPr algn="ctr"/>
+            <a:endParaRPr lang="en-US"/>
+          </a:p>
+        </p:txBody>
+      </p:sp>
+      <p:pic>
+        <p:nvPicPr>
+          <p:cNvPr id="17" name="Picture 16">
+            <a:extLst>
+              <a:ext uri="{FF2B5EF4-FFF2-40B4-BE49-F238E27FC236}">
+                <a16:creationId xmlns:a16="http://schemas.microsoft.com/office/drawing/2014/main" id="{76B9EAE2-1DBD-4A06-1016-C412B6F3F3CD}"/>
+              </a:ext>
+            </a:extLst>
+          </p:cNvPr>
+          <p:cNvPicPr>
+            <a:picLocks noChangeAspect="1"/>
+          </p:cNvPicPr>
+          <p:nvPr/>
+        </p:nvPicPr>
+        <p:blipFill>
+          <a:blip r:embed="rId2" cstate="print">
+            <a:extLst>
+              <a:ext uri="{28A0092B-C50C-407E-A947-70E740481C1C}">
+                <a14:useLocalDpi xmlns:a14="http://schemas.microsoft.com/office/drawing/2010/main" val="0"/>
+              </a:ext>
+            </a:extLst>
+          </a:blip>
+          <a:stretch>
+            <a:fillRect/>
+          </a:stretch>
+        </p:blipFill>
+        <p:spPr>
+          <a:xfrm>
+            <a:off x="4270802" y="2723410"/>
+            <a:ext cx="3115436" cy="2484984"/>
+          </a:xfrm>
+          <a:prstGeom prst="rect">
+            <a:avLst/>
+          </a:prstGeom>
+        </p:spPr>
+      </p:pic>
     </p:spTree>
     <p:extLst>
       <p:ext uri="{BB962C8B-B14F-4D97-AF65-F5344CB8AC3E}">

</xml_diff>

<commit_message>
change "verifier requirement automation" into "measurement generation"
</commit_message>
<xml_diff>
--- a/ADE_copilot/CIC-2025_PPT_ADECopilot.pptx
+++ b/ADE_copilot/CIC-2025_PPT_ADECopilot.pptx
@@ -5893,15 +5893,21 @@
             <p:ph type="title"/>
           </p:nvPr>
         </p:nvSpPr>
-        <p:spPr/>
+        <p:spPr>
+          <a:xfrm>
+            <a:off x="446313" y="336844"/>
+            <a:ext cx="11612880" cy="565150"/>
+          </a:xfrm>
+        </p:spPr>
         <p:txBody>
           <a:bodyPr/>
           <a:lstStyle/>
           <a:p>
             <a:r>
-              <a:rPr lang="en-US" dirty="0"/>
-              <a:t>Verifier Requirements Automation</a:t>
-            </a:r>
+              <a:rPr lang="en-US" altLang="zh-CN" dirty="0"/>
+              <a:t>Measurement Generation</a:t>
+            </a:r>
+            <a:endParaRPr lang="en-US" dirty="0"/>
           </a:p>
         </p:txBody>
       </p:sp>
@@ -7459,9 +7465,10 @@
           <a:lstStyle/>
           <a:p>
             <a:r>
-              <a:rPr lang="en-US" dirty="0"/>
-              <a:t>Verifier Requirements Automation</a:t>
-            </a:r>
+              <a:rPr lang="en-US" altLang="zh-CN" dirty="0"/>
+              <a:t>Measurement Generation</a:t>
+            </a:r>
+            <a:endParaRPr lang="en-US" dirty="0"/>
           </a:p>
         </p:txBody>
       </p:sp>
@@ -7488,7 +7495,7 @@
           <a:p>
             <a:r>
               <a:rPr lang="en-US" dirty="0"/>
-              <a:t>How ADE Copilot solve this problem</a:t>
+              <a:t>How ADE Copilot solves this problem</a:t>
             </a:r>
           </a:p>
           <a:p>
@@ -8448,9 +8455,10 @@
           <a:lstStyle/>
           <a:p>
             <a:r>
-              <a:rPr lang="en-US" dirty="0"/>
-              <a:t>Verifier Requirements Automation</a:t>
-            </a:r>
+              <a:rPr lang="en-US" altLang="zh-CN" dirty="0"/>
+              <a:t>Measurement Generation</a:t>
+            </a:r>
+            <a:endParaRPr lang="en-US" dirty="0"/>
           </a:p>
         </p:txBody>
       </p:sp>
@@ -8477,7 +8485,7 @@
           <a:p>
             <a:r>
               <a:rPr lang="en-US" dirty="0"/>
-              <a:t>How ADE Copilot solve this problem</a:t>
+              <a:t>How ADE Copilot solves this problem</a:t>
             </a:r>
           </a:p>
           <a:p>
@@ -11297,28 +11305,6 @@
 </file>
 
 <file path=customXml/item1.xml><?xml version="1.0" encoding="utf-8"?>
-<?mso-contentType ?>
-<FormTemplates xmlns="http://schemas.microsoft.com/sharepoint/v3/contenttype/forms">
-  <Display>DocumentLibraryForm</Display>
-  <Edit>DocumentLibraryForm</Edit>
-  <New>DocumentLibraryForm</New>
-</FormTemplates>
-</file>
-
-<file path=customXml/item2.xml><?xml version="1.0" encoding="utf-8"?>
-<p:properties xmlns:p="http://schemas.microsoft.com/office/2006/metadata/properties" xmlns:xsi="http://www.w3.org/2001/XMLSchema-instance" xmlns:pc="http://schemas.microsoft.com/office/infopath/2007/PartnerControls">
-  <documentManagement>
-    <TaxCatchAll xmlns="7b8458dc-598e-4883-bee3-b65cd33e2373" xsi:nil="true"/>
-    <lcf76f155ced4ddcb4097134ff3c332f xmlns="4d616b5b-752e-49e1-bc84-983707c3b45d">
-      <Terms xmlns="http://schemas.microsoft.com/office/infopath/2007/PartnerControls"/>
-    </lcf76f155ced4ddcb4097134ff3c332f>
-    <_ip_UnifiedCompliancePolicyUIAction xmlns="http://schemas.microsoft.com/sharepoint/v3" xsi:nil="true"/>
-    <_ip_UnifiedCompliancePolicyProperties xmlns="http://schemas.microsoft.com/sharepoint/v3" xsi:nil="true"/>
-  </documentManagement>
-</p:properties>
-</file>
-
-<file path=customXml/item3.xml><?xml version="1.0" encoding="utf-8"?>
 <ct:contentTypeSchema xmlns:ct="http://schemas.microsoft.com/office/2006/metadata/contentType" xmlns:ma="http://schemas.microsoft.com/office/2006/metadata/properties/metaAttributes" ct:_="" ma:_="" ma:contentTypeName="Document" ma:contentTypeID="0x010100EA1802221C47224DAD2E1CD157C76B66" ma:contentTypeVersion="15" ma:contentTypeDescription="Create a new document." ma:contentTypeScope="" ma:versionID="363dbe0862a1b9cf731691ddd7ebcb66">
   <xsd:schema xmlns:xsd="http://www.w3.org/2001/XMLSchema" xmlns:xs="http://www.w3.org/2001/XMLSchema" xmlns:p="http://schemas.microsoft.com/office/2006/metadata/properties" xmlns:ns1="http://schemas.microsoft.com/sharepoint/v3" xmlns:ns2="4d616b5b-752e-49e1-bc84-983707c3b45d" xmlns:ns3="7b8458dc-598e-4883-bee3-b65cd33e2373" targetNamespace="http://schemas.microsoft.com/office/2006/metadata/properties" ma:root="true" ma:fieldsID="2291c4afe0501b639051f6a2b720ae43" ns1:_="" ns2:_="" ns3:_="">
     <xsd:import namespace="http://schemas.microsoft.com/sharepoint/v3"/>
@@ -11556,10 +11542,44 @@
 </ct:contentTypeSchema>
 </file>
 
+<file path=customXml/item2.xml><?xml version="1.0" encoding="utf-8"?>
+<p:properties xmlns:p="http://schemas.microsoft.com/office/2006/metadata/properties" xmlns:xsi="http://www.w3.org/2001/XMLSchema-instance" xmlns:pc="http://schemas.microsoft.com/office/infopath/2007/PartnerControls">
+  <documentManagement>
+    <TaxCatchAll xmlns="7b8458dc-598e-4883-bee3-b65cd33e2373" xsi:nil="true"/>
+    <lcf76f155ced4ddcb4097134ff3c332f xmlns="4d616b5b-752e-49e1-bc84-983707c3b45d">
+      <Terms xmlns="http://schemas.microsoft.com/office/infopath/2007/PartnerControls"/>
+    </lcf76f155ced4ddcb4097134ff3c332f>
+    <_ip_UnifiedCompliancePolicyUIAction xmlns="http://schemas.microsoft.com/sharepoint/v3" xsi:nil="true"/>
+    <_ip_UnifiedCompliancePolicyProperties xmlns="http://schemas.microsoft.com/sharepoint/v3" xsi:nil="true"/>
+  </documentManagement>
+</p:properties>
+</file>
+
+<file path=customXml/item3.xml><?xml version="1.0" encoding="utf-8"?>
+<?mso-contentType ?>
+<FormTemplates xmlns="http://schemas.microsoft.com/sharepoint/v3/contenttype/forms">
+  <Display>DocumentLibraryForm</Display>
+  <Edit>DocumentLibraryForm</Edit>
+  <New>DocumentLibraryForm</New>
+</FormTemplates>
+</file>
+
 <file path=customXml/itemProps1.xml><?xml version="1.0" encoding="utf-8"?>
-<ds:datastoreItem xmlns:ds="http://schemas.openxmlformats.org/officeDocument/2006/customXml" ds:itemID="{26A66B61-4F06-44C8-9162-4B6D2BCADA53}">
+<ds:datastoreItem xmlns:ds="http://schemas.openxmlformats.org/officeDocument/2006/customXml" ds:itemID="{5F414E3A-68DA-42A0-8EE0-8D409A8A8051}">
   <ds:schemaRefs>
-    <ds:schemaRef ds:uri="http://schemas.microsoft.com/sharepoint/v3/contenttype/forms"/>
+    <ds:schemaRef ds:uri="http://schemas.microsoft.com/office/2006/metadata/contentType"/>
+    <ds:schemaRef ds:uri="http://schemas.microsoft.com/office/2006/metadata/properties/metaAttributes"/>
+    <ds:schemaRef ds:uri="http://www.w3.org/2001/XMLSchema"/>
+    <ds:schemaRef ds:uri="http://schemas.microsoft.com/office/2006/metadata/properties"/>
+    <ds:schemaRef ds:uri="http://schemas.microsoft.com/sharepoint/v3"/>
+    <ds:schemaRef ds:uri="4d616b5b-752e-49e1-bc84-983707c3b45d"/>
+    <ds:schemaRef ds:uri="7b8458dc-598e-4883-bee3-b65cd33e2373"/>
+    <ds:schemaRef ds:uri="http://schemas.microsoft.com/office/2006/documentManagement/types"/>
+    <ds:schemaRef ds:uri="http://schemas.microsoft.com/office/infopath/2007/PartnerControls"/>
+    <ds:schemaRef ds:uri="http://schemas.openxmlformats.org/package/2006/metadata/core-properties"/>
+    <ds:schemaRef ds:uri="http://purl.org/dc/elements/1.1/"/>
+    <ds:schemaRef ds:uri="http://purl.org/dc/terms/"/>
+    <ds:schemaRef ds:uri="http://schemas.microsoft.com/internal/obd"/>
   </ds:schemaRefs>
 </ds:datastoreItem>
 </file>
@@ -11583,21 +11603,9 @@
 </file>
 
 <file path=customXml/itemProps3.xml><?xml version="1.0" encoding="utf-8"?>
-<ds:datastoreItem xmlns:ds="http://schemas.openxmlformats.org/officeDocument/2006/customXml" ds:itemID="{5F414E3A-68DA-42A0-8EE0-8D409A8A8051}">
+<ds:datastoreItem xmlns:ds="http://schemas.openxmlformats.org/officeDocument/2006/customXml" ds:itemID="{26A66B61-4F06-44C8-9162-4B6D2BCADA53}">
   <ds:schemaRefs>
-    <ds:schemaRef ds:uri="http://schemas.microsoft.com/office/2006/metadata/contentType"/>
-    <ds:schemaRef ds:uri="http://schemas.microsoft.com/office/2006/metadata/properties/metaAttributes"/>
-    <ds:schemaRef ds:uri="http://www.w3.org/2001/XMLSchema"/>
-    <ds:schemaRef ds:uri="http://schemas.microsoft.com/office/2006/metadata/properties"/>
-    <ds:schemaRef ds:uri="http://schemas.microsoft.com/sharepoint/v3"/>
-    <ds:schemaRef ds:uri="4d616b5b-752e-49e1-bc84-983707c3b45d"/>
-    <ds:schemaRef ds:uri="7b8458dc-598e-4883-bee3-b65cd33e2373"/>
-    <ds:schemaRef ds:uri="http://schemas.microsoft.com/office/2006/documentManagement/types"/>
-    <ds:schemaRef ds:uri="http://schemas.microsoft.com/office/infopath/2007/PartnerControls"/>
-    <ds:schemaRef ds:uri="http://schemas.openxmlformats.org/package/2006/metadata/core-properties"/>
-    <ds:schemaRef ds:uri="http://purl.org/dc/elements/1.1/"/>
-    <ds:schemaRef ds:uri="http://purl.org/dc/terms/"/>
-    <ds:schemaRef ds:uri="http://schemas.microsoft.com/internal/obd"/>
+    <ds:schemaRef ds:uri="http://schemas.microsoft.com/sharepoint/v3/contenttype/forms"/>
   </ds:schemaRefs>
 </ds:datastoreItem>
 </file>
</xml_diff>

<commit_message>
change 'requirement' in dataset table title to 'measurement'
</commit_message>
<xml_diff>
--- a/ADE_copilot/CIC-2025_PPT_ADECopilot.pptx
+++ b/ADE_copilot/CIC-2025_PPT_ADECopilot.pptx
@@ -8754,7 +8754,7 @@
           <p:nvPr>
             <p:extLst>
               <p:ext uri="{D42A27DB-BD31-4B8C-83A1-F6EECF244321}">
-                <p14:modId xmlns:p14="http://schemas.microsoft.com/office/powerpoint/2010/main" val="957261442"/>
+                <p14:modId xmlns:p14="http://schemas.microsoft.com/office/powerpoint/2010/main" val="3517806160"/>
               </p:ext>
             </p:extLst>
           </p:nvPr>
@@ -8793,10 +8793,9 @@
                     <a:p>
                       <a:pPr algn="ctr"/>
                       <a:r>
-                        <a:rPr lang="en-US"/>
+                        <a:rPr lang="en-US" dirty="0"/>
                         <a:t>ID</a:t>
                       </a:r>
-                      <a:endParaRPr lang="en-US" dirty="0"/>
                     </a:p>
                   </a:txBody>
                   <a:tcPr/>
@@ -8808,9 +8807,10 @@
                     <a:p>
                       <a:pPr algn="ctr"/>
                       <a:r>
-                        <a:rPr lang="en-US" dirty="0"/>
-                        <a:t>Requirements</a:t>
+                        <a:rPr lang="en-US" altLang="zh-CN" dirty="0"/>
+                        <a:t>Measurement</a:t>
                       </a:r>
+                      <a:endParaRPr lang="en-US" dirty="0"/>
                     </a:p>
                   </a:txBody>
                   <a:tcPr/>
@@ -8829,7 +8829,7 @@
                     <a:p>
                       <a:pPr algn="ctr"/>
                       <a:r>
-                        <a:rPr lang="en-US" sz="1400" b="0" i="0" kern="1200" dirty="0">
+                        <a:rPr lang="en-US" sz="1400" b="0" i="0" kern="1200">
                           <a:solidFill>
                             <a:schemeClr val="dk1"/>
                           </a:solidFill>
@@ -8852,9 +8852,10 @@
                     <a:p>
                       <a:pPr algn="l"/>
                       <a:r>
-                        <a:rPr lang="en-US" sz="1400" dirty="0"/>
+                        <a:rPr lang="en-US" sz="1400"/>
                         <a:t>fallTime(VT("/net12") 0 nil 0 nil 10 90 nil "time" )-riseTime(VT("/net12") 0 nil 0 nil 10 90 nil "time" )</a:t>
                       </a:r>
+                      <a:endParaRPr lang="en-US" sz="1400" dirty="0"/>
                     </a:p>
                   </a:txBody>
                   <a:tcPr/>
@@ -8873,9 +8874,10 @@
                     <a:p>
                       <a:pPr algn="ctr"/>
                       <a:r>
-                        <a:rPr lang="en-US" sz="1400" dirty="0"/>
+                        <a:rPr lang="en-US" sz="1400"/>
                         <a:t>2</a:t>
                       </a:r>
+                      <a:endParaRPr lang="en-US" sz="1400" dirty="0"/>
                     </a:p>
                   </a:txBody>
                   <a:tcPr/>
@@ -8887,9 +8889,10 @@
                     <a:p>
                       <a:pPr algn="l"/>
                       <a:r>
-                        <a:rPr lang="en-US" sz="1400" dirty="0"/>
+                        <a:rPr lang="en-US" sz="1400"/>
                         <a:t>ymax(IT("/M1/D"))</a:t>
                       </a:r>
+                      <a:endParaRPr lang="en-US" sz="1400" dirty="0"/>
                     </a:p>
                   </a:txBody>
                   <a:tcPr/>
@@ -8908,9 +8911,10 @@
                     <a:p>
                       <a:pPr algn="ctr"/>
                       <a:r>
-                        <a:rPr lang="en-US" sz="1400" dirty="0"/>
+                        <a:rPr lang="en-US" sz="1400"/>
                         <a:t>…</a:t>
                       </a:r>
+                      <a:endParaRPr lang="en-US" sz="1400" dirty="0"/>
                     </a:p>
                   </a:txBody>
                   <a:tcPr/>
@@ -11305,6 +11309,28 @@
 </file>
 
 <file path=customXml/item1.xml><?xml version="1.0" encoding="utf-8"?>
+<?mso-contentType ?>
+<FormTemplates xmlns="http://schemas.microsoft.com/sharepoint/v3/contenttype/forms">
+  <Display>DocumentLibraryForm</Display>
+  <Edit>DocumentLibraryForm</Edit>
+  <New>DocumentLibraryForm</New>
+</FormTemplates>
+</file>
+
+<file path=customXml/item2.xml><?xml version="1.0" encoding="utf-8"?>
+<p:properties xmlns:p="http://schemas.microsoft.com/office/2006/metadata/properties" xmlns:xsi="http://www.w3.org/2001/XMLSchema-instance" xmlns:pc="http://schemas.microsoft.com/office/infopath/2007/PartnerControls">
+  <documentManagement>
+    <TaxCatchAll xmlns="7b8458dc-598e-4883-bee3-b65cd33e2373" xsi:nil="true"/>
+    <lcf76f155ced4ddcb4097134ff3c332f xmlns="4d616b5b-752e-49e1-bc84-983707c3b45d">
+      <Terms xmlns="http://schemas.microsoft.com/office/infopath/2007/PartnerControls"/>
+    </lcf76f155ced4ddcb4097134ff3c332f>
+    <_ip_UnifiedCompliancePolicyUIAction xmlns="http://schemas.microsoft.com/sharepoint/v3" xsi:nil="true"/>
+    <_ip_UnifiedCompliancePolicyProperties xmlns="http://schemas.microsoft.com/sharepoint/v3" xsi:nil="true"/>
+  </documentManagement>
+</p:properties>
+</file>
+
+<file path=customXml/item3.xml><?xml version="1.0" encoding="utf-8"?>
 <ct:contentTypeSchema xmlns:ct="http://schemas.microsoft.com/office/2006/metadata/contentType" xmlns:ma="http://schemas.microsoft.com/office/2006/metadata/properties/metaAttributes" ct:_="" ma:_="" ma:contentTypeName="Document" ma:contentTypeID="0x010100EA1802221C47224DAD2E1CD157C76B66" ma:contentTypeVersion="15" ma:contentTypeDescription="Create a new document." ma:contentTypeScope="" ma:versionID="363dbe0862a1b9cf731691ddd7ebcb66">
   <xsd:schema xmlns:xsd="http://www.w3.org/2001/XMLSchema" xmlns:xs="http://www.w3.org/2001/XMLSchema" xmlns:p="http://schemas.microsoft.com/office/2006/metadata/properties" xmlns:ns1="http://schemas.microsoft.com/sharepoint/v3" xmlns:ns2="4d616b5b-752e-49e1-bc84-983707c3b45d" xmlns:ns3="7b8458dc-598e-4883-bee3-b65cd33e2373" targetNamespace="http://schemas.microsoft.com/office/2006/metadata/properties" ma:root="true" ma:fieldsID="2291c4afe0501b639051f6a2b720ae43" ns1:_="" ns2:_="" ns3:_="">
     <xsd:import namespace="http://schemas.microsoft.com/sharepoint/v3"/>
@@ -11542,44 +11568,10 @@
 </ct:contentTypeSchema>
 </file>
 
-<file path=customXml/item2.xml><?xml version="1.0" encoding="utf-8"?>
-<p:properties xmlns:p="http://schemas.microsoft.com/office/2006/metadata/properties" xmlns:xsi="http://www.w3.org/2001/XMLSchema-instance" xmlns:pc="http://schemas.microsoft.com/office/infopath/2007/PartnerControls">
-  <documentManagement>
-    <TaxCatchAll xmlns="7b8458dc-598e-4883-bee3-b65cd33e2373" xsi:nil="true"/>
-    <lcf76f155ced4ddcb4097134ff3c332f xmlns="4d616b5b-752e-49e1-bc84-983707c3b45d">
-      <Terms xmlns="http://schemas.microsoft.com/office/infopath/2007/PartnerControls"/>
-    </lcf76f155ced4ddcb4097134ff3c332f>
-    <_ip_UnifiedCompliancePolicyUIAction xmlns="http://schemas.microsoft.com/sharepoint/v3" xsi:nil="true"/>
-    <_ip_UnifiedCompliancePolicyProperties xmlns="http://schemas.microsoft.com/sharepoint/v3" xsi:nil="true"/>
-  </documentManagement>
-</p:properties>
-</file>
-
-<file path=customXml/item3.xml><?xml version="1.0" encoding="utf-8"?>
-<?mso-contentType ?>
-<FormTemplates xmlns="http://schemas.microsoft.com/sharepoint/v3/contenttype/forms">
-  <Display>DocumentLibraryForm</Display>
-  <Edit>DocumentLibraryForm</Edit>
-  <New>DocumentLibraryForm</New>
-</FormTemplates>
-</file>
-
 <file path=customXml/itemProps1.xml><?xml version="1.0" encoding="utf-8"?>
-<ds:datastoreItem xmlns:ds="http://schemas.openxmlformats.org/officeDocument/2006/customXml" ds:itemID="{5F414E3A-68DA-42A0-8EE0-8D409A8A8051}">
+<ds:datastoreItem xmlns:ds="http://schemas.openxmlformats.org/officeDocument/2006/customXml" ds:itemID="{26A66B61-4F06-44C8-9162-4B6D2BCADA53}">
   <ds:schemaRefs>
-    <ds:schemaRef ds:uri="http://schemas.microsoft.com/office/2006/metadata/contentType"/>
-    <ds:schemaRef ds:uri="http://schemas.microsoft.com/office/2006/metadata/properties/metaAttributes"/>
-    <ds:schemaRef ds:uri="http://www.w3.org/2001/XMLSchema"/>
-    <ds:schemaRef ds:uri="http://schemas.microsoft.com/office/2006/metadata/properties"/>
-    <ds:schemaRef ds:uri="http://schemas.microsoft.com/sharepoint/v3"/>
-    <ds:schemaRef ds:uri="4d616b5b-752e-49e1-bc84-983707c3b45d"/>
-    <ds:schemaRef ds:uri="7b8458dc-598e-4883-bee3-b65cd33e2373"/>
-    <ds:schemaRef ds:uri="http://schemas.microsoft.com/office/2006/documentManagement/types"/>
-    <ds:schemaRef ds:uri="http://schemas.microsoft.com/office/infopath/2007/PartnerControls"/>
-    <ds:schemaRef ds:uri="http://schemas.openxmlformats.org/package/2006/metadata/core-properties"/>
-    <ds:schemaRef ds:uri="http://purl.org/dc/elements/1.1/"/>
-    <ds:schemaRef ds:uri="http://purl.org/dc/terms/"/>
-    <ds:schemaRef ds:uri="http://schemas.microsoft.com/internal/obd"/>
+    <ds:schemaRef ds:uri="http://schemas.microsoft.com/sharepoint/v3/contenttype/forms"/>
   </ds:schemaRefs>
 </ds:datastoreItem>
 </file>
@@ -11603,9 +11595,21 @@
 </file>
 
 <file path=customXml/itemProps3.xml><?xml version="1.0" encoding="utf-8"?>
-<ds:datastoreItem xmlns:ds="http://schemas.openxmlformats.org/officeDocument/2006/customXml" ds:itemID="{26A66B61-4F06-44C8-9162-4B6D2BCADA53}">
+<ds:datastoreItem xmlns:ds="http://schemas.openxmlformats.org/officeDocument/2006/customXml" ds:itemID="{5F414E3A-68DA-42A0-8EE0-8D409A8A8051}">
   <ds:schemaRefs>
-    <ds:schemaRef ds:uri="http://schemas.microsoft.com/sharepoint/v3/contenttype/forms"/>
+    <ds:schemaRef ds:uri="http://schemas.microsoft.com/office/2006/metadata/contentType"/>
+    <ds:schemaRef ds:uri="http://schemas.microsoft.com/office/2006/metadata/properties/metaAttributes"/>
+    <ds:schemaRef ds:uri="http://www.w3.org/2001/XMLSchema"/>
+    <ds:schemaRef ds:uri="http://schemas.microsoft.com/office/2006/metadata/properties"/>
+    <ds:schemaRef ds:uri="http://schemas.microsoft.com/sharepoint/v3"/>
+    <ds:schemaRef ds:uri="4d616b5b-752e-49e1-bc84-983707c3b45d"/>
+    <ds:schemaRef ds:uri="7b8458dc-598e-4883-bee3-b65cd33e2373"/>
+    <ds:schemaRef ds:uri="http://schemas.microsoft.com/office/2006/documentManagement/types"/>
+    <ds:schemaRef ds:uri="http://schemas.microsoft.com/office/infopath/2007/PartnerControls"/>
+    <ds:schemaRef ds:uri="http://schemas.openxmlformats.org/package/2006/metadata/core-properties"/>
+    <ds:schemaRef ds:uri="http://purl.org/dc/elements/1.1/"/>
+    <ds:schemaRef ds:uri="http://purl.org/dc/terms/"/>
+    <ds:schemaRef ds:uri="http://schemas.microsoft.com/internal/obd"/>
   </ds:schemaRefs>
 </ds:datastoreItem>
 </file>
</xml_diff>